<commit_message>
root is now not resizeable
</commit_message>
<xml_diff>
--- a/instructions.pptx
+++ b/instructions.pptx
@@ -2,18 +2,18 @@
 <file path=ppt/presentation.xml><?xml version="1.0" encoding="utf-8"?>
 <p:presentation xmlns:a="http://schemas.openxmlformats.org/drawingml/2006/main" xmlns:r="http://schemas.openxmlformats.org/officeDocument/2006/relationships" xmlns:p="http://schemas.openxmlformats.org/presentationml/2006/main" rtl="1" saveSubsetFonts="1">
   <p:sldMasterIdLst>
-    <p:sldMasterId id="2147483648" r:id="rId1"/>
+    <p:sldMasterId id="2147483660" r:id="rId1"/>
   </p:sldMasterIdLst>
   <p:sldIdLst>
     <p:sldId id="256" r:id="rId2"/>
   </p:sldIdLst>
-  <p:sldSz cx="12192000" cy="6858000"/>
+  <p:sldSz cx="27000200" cy="18000663"/>
   <p:notesSz cx="6858000" cy="9144000"/>
   <p:defaultTextStyle>
     <a:defPPr>
-      <a:defRPr lang="en-IL"/>
+      <a:defRPr lang="en-US"/>
     </a:defPPr>
-    <a:lvl1pPr marL="0" algn="r" defTabSz="914400" rtl="1" eaLnBrk="1" latinLnBrk="0" hangingPunct="1">
+    <a:lvl1pPr marL="0" algn="l" defTabSz="457200" rtl="0" eaLnBrk="1" latinLnBrk="0" hangingPunct="1">
       <a:defRPr sz="1800" kern="1200">
         <a:solidFill>
           <a:schemeClr val="tx1"/>
@@ -23,7 +23,7 @@
         <a:cs typeface="+mn-cs"/>
       </a:defRPr>
     </a:lvl1pPr>
-    <a:lvl2pPr marL="457200" algn="r" defTabSz="914400" rtl="1" eaLnBrk="1" latinLnBrk="0" hangingPunct="1">
+    <a:lvl2pPr marL="457200" algn="l" defTabSz="457200" rtl="0" eaLnBrk="1" latinLnBrk="0" hangingPunct="1">
       <a:defRPr sz="1800" kern="1200">
         <a:solidFill>
           <a:schemeClr val="tx1"/>
@@ -33,7 +33,7 @@
         <a:cs typeface="+mn-cs"/>
       </a:defRPr>
     </a:lvl2pPr>
-    <a:lvl3pPr marL="914400" algn="r" defTabSz="914400" rtl="1" eaLnBrk="1" latinLnBrk="0" hangingPunct="1">
+    <a:lvl3pPr marL="914400" algn="l" defTabSz="457200" rtl="0" eaLnBrk="1" latinLnBrk="0" hangingPunct="1">
       <a:defRPr sz="1800" kern="1200">
         <a:solidFill>
           <a:schemeClr val="tx1"/>
@@ -43,7 +43,7 @@
         <a:cs typeface="+mn-cs"/>
       </a:defRPr>
     </a:lvl3pPr>
-    <a:lvl4pPr marL="1371600" algn="r" defTabSz="914400" rtl="1" eaLnBrk="1" latinLnBrk="0" hangingPunct="1">
+    <a:lvl4pPr marL="1371600" algn="l" defTabSz="457200" rtl="0" eaLnBrk="1" latinLnBrk="0" hangingPunct="1">
       <a:defRPr sz="1800" kern="1200">
         <a:solidFill>
           <a:schemeClr val="tx1"/>
@@ -53,7 +53,7 @@
         <a:cs typeface="+mn-cs"/>
       </a:defRPr>
     </a:lvl4pPr>
-    <a:lvl5pPr marL="1828800" algn="r" defTabSz="914400" rtl="1" eaLnBrk="1" latinLnBrk="0" hangingPunct="1">
+    <a:lvl5pPr marL="1828800" algn="l" defTabSz="457200" rtl="0" eaLnBrk="1" latinLnBrk="0" hangingPunct="1">
       <a:defRPr sz="1800" kern="1200">
         <a:solidFill>
           <a:schemeClr val="tx1"/>
@@ -63,7 +63,7 @@
         <a:cs typeface="+mn-cs"/>
       </a:defRPr>
     </a:lvl5pPr>
-    <a:lvl6pPr marL="2286000" algn="r" defTabSz="914400" rtl="1" eaLnBrk="1" latinLnBrk="0" hangingPunct="1">
+    <a:lvl6pPr marL="2286000" algn="l" defTabSz="457200" rtl="0" eaLnBrk="1" latinLnBrk="0" hangingPunct="1">
       <a:defRPr sz="1800" kern="1200">
         <a:solidFill>
           <a:schemeClr val="tx1"/>
@@ -73,7 +73,7 @@
         <a:cs typeface="+mn-cs"/>
       </a:defRPr>
     </a:lvl6pPr>
-    <a:lvl7pPr marL="2743200" algn="r" defTabSz="914400" rtl="1" eaLnBrk="1" latinLnBrk="0" hangingPunct="1">
+    <a:lvl7pPr marL="2743200" algn="l" defTabSz="457200" rtl="0" eaLnBrk="1" latinLnBrk="0" hangingPunct="1">
       <a:defRPr sz="1800" kern="1200">
         <a:solidFill>
           <a:schemeClr val="tx1"/>
@@ -83,7 +83,7 @@
         <a:cs typeface="+mn-cs"/>
       </a:defRPr>
     </a:lvl7pPr>
-    <a:lvl8pPr marL="3200400" algn="r" defTabSz="914400" rtl="1" eaLnBrk="1" latinLnBrk="0" hangingPunct="1">
+    <a:lvl8pPr marL="3200400" algn="l" defTabSz="457200" rtl="0" eaLnBrk="1" latinLnBrk="0" hangingPunct="1">
       <a:defRPr sz="1800" kern="1200">
         <a:solidFill>
           <a:schemeClr val="tx1"/>
@@ -93,7 +93,7 @@
         <a:cs typeface="+mn-cs"/>
       </a:defRPr>
     </a:lvl8pPr>
-    <a:lvl9pPr marL="3657600" algn="r" defTabSz="914400" rtl="1" eaLnBrk="1" latinLnBrk="0" hangingPunct="1">
+    <a:lvl9pPr marL="3657600" algn="l" defTabSz="457200" rtl="0" eaLnBrk="1" latinLnBrk="0" hangingPunct="1">
       <a:defRPr sz="1800" kern="1200">
         <a:solidFill>
           <a:schemeClr val="tx1"/>
@@ -104,6 +104,11 @@
       </a:defRPr>
     </a:lvl9pPr>
   </p:defaultTextStyle>
+  <p:extLst>
+    <p:ext uri="{EFAFB233-063F-42B5-8137-9DF3F51BA10A}">
+      <p15:sldGuideLst xmlns:p15="http://schemas.microsoft.com/office/powerpoint/2012/main"/>
+    </p:ext>
+  </p:extLst>
 </p:presentation>
 </file>
 
@@ -126,13 +131,7 @@
       </p:grpSpPr>
       <p:sp>
         <p:nvSpPr>
-          <p:cNvPr id="2" name="כותרת 1">
-            <a:extLst>
-              <a:ext uri="{FF2B5EF4-FFF2-40B4-BE49-F238E27FC236}">
-                <a16:creationId xmlns:a16="http://schemas.microsoft.com/office/drawing/2014/main" id="{54BF55FD-C16C-4189-980B-E490D204A32B}"/>
-              </a:ext>
-            </a:extLst>
-          </p:cNvPr>
+          <p:cNvPr id="2" name="Title 1"/>
           <p:cNvSpPr>
             <a:spLocks noGrp="1"/>
           </p:cNvSpPr>
@@ -142,15 +141,15 @@
         </p:nvSpPr>
         <p:spPr>
           <a:xfrm>
-            <a:off x="1524000" y="1122363"/>
-            <a:ext cx="9144000" cy="2387600"/>
+            <a:off x="2025015" y="2945943"/>
+            <a:ext cx="22950170" cy="6266897"/>
           </a:xfrm>
         </p:spPr>
         <p:txBody>
           <a:bodyPr anchor="b"/>
           <a:lstStyle>
             <a:lvl1pPr algn="ctr">
-              <a:defRPr sz="6000"/>
+              <a:defRPr sz="15749"/>
             </a:lvl1pPr>
           </a:lstStyle>
           <a:p>
@@ -158,19 +157,13 @@
               <a:rPr lang="he-IL"/>
               <a:t>לחץ כדי לערוך סגנון כותרת של תבנית בסיס</a:t>
             </a:r>
-            <a:endParaRPr lang="en-IL"/>
-          </a:p>
-        </p:txBody>
-      </p:sp>
-      <p:sp>
-        <p:nvSpPr>
-          <p:cNvPr id="3" name="כותרת משנה 2">
-            <a:extLst>
-              <a:ext uri="{FF2B5EF4-FFF2-40B4-BE49-F238E27FC236}">
-                <a16:creationId xmlns:a16="http://schemas.microsoft.com/office/drawing/2014/main" id="{D85EE0C5-35A7-4A77-A4AD-EEEA5F905E7A}"/>
-              </a:ext>
-            </a:extLst>
-          </p:cNvPr>
+            <a:endParaRPr lang="en-US" dirty="0"/>
+          </a:p>
+        </p:txBody>
+      </p:sp>
+      <p:sp>
+        <p:nvSpPr>
+          <p:cNvPr id="3" name="Subtitle 2"/>
           <p:cNvSpPr>
             <a:spLocks noGrp="1"/>
           </p:cNvSpPr>
@@ -180,8 +173,8 @@
         </p:nvSpPr>
         <p:spPr>
           <a:xfrm>
-            <a:off x="1524000" y="3602038"/>
-            <a:ext cx="9144000" cy="1655762"/>
+            <a:off x="3375025" y="9454516"/>
+            <a:ext cx="20250150" cy="4345992"/>
           </a:xfrm>
         </p:spPr>
         <p:txBody>
@@ -189,39 +182,39 @@
           <a:lstStyle>
             <a:lvl1pPr marL="0" indent="0" algn="ctr">
               <a:buNone/>
-              <a:defRPr sz="2400"/>
+              <a:defRPr sz="6300"/>
             </a:lvl1pPr>
-            <a:lvl2pPr marL="457200" indent="0" algn="ctr">
-              <a:buNone/>
-              <a:defRPr sz="2000"/>
+            <a:lvl2pPr marL="1200059" indent="0" algn="ctr">
+              <a:buNone/>
+              <a:defRPr sz="5250"/>
             </a:lvl2pPr>
-            <a:lvl3pPr marL="914400" indent="0" algn="ctr">
-              <a:buNone/>
-              <a:defRPr sz="1800"/>
+            <a:lvl3pPr marL="2400117" indent="0" algn="ctr">
+              <a:buNone/>
+              <a:defRPr sz="4725"/>
             </a:lvl3pPr>
-            <a:lvl4pPr marL="1371600" indent="0" algn="ctr">
-              <a:buNone/>
-              <a:defRPr sz="1600"/>
+            <a:lvl4pPr marL="3600176" indent="0" algn="ctr">
+              <a:buNone/>
+              <a:defRPr sz="4200"/>
             </a:lvl4pPr>
-            <a:lvl5pPr marL="1828800" indent="0" algn="ctr">
-              <a:buNone/>
-              <a:defRPr sz="1600"/>
+            <a:lvl5pPr marL="4800234" indent="0" algn="ctr">
+              <a:buNone/>
+              <a:defRPr sz="4200"/>
             </a:lvl5pPr>
-            <a:lvl6pPr marL="2286000" indent="0" algn="ctr">
-              <a:buNone/>
-              <a:defRPr sz="1600"/>
+            <a:lvl6pPr marL="6000293" indent="0" algn="ctr">
+              <a:buNone/>
+              <a:defRPr sz="4200"/>
             </a:lvl6pPr>
-            <a:lvl7pPr marL="2743200" indent="0" algn="ctr">
-              <a:buNone/>
-              <a:defRPr sz="1600"/>
+            <a:lvl7pPr marL="7200351" indent="0" algn="ctr">
+              <a:buNone/>
+              <a:defRPr sz="4200"/>
             </a:lvl7pPr>
-            <a:lvl8pPr marL="3200400" indent="0" algn="ctr">
-              <a:buNone/>
-              <a:defRPr sz="1600"/>
+            <a:lvl8pPr marL="8400410" indent="0" algn="ctr">
+              <a:buNone/>
+              <a:defRPr sz="4200"/>
             </a:lvl8pPr>
-            <a:lvl9pPr marL="3657600" indent="0" algn="ctr">
-              <a:buNone/>
-              <a:defRPr sz="1600"/>
+            <a:lvl9pPr marL="9600468" indent="0" algn="ctr">
+              <a:buNone/>
+              <a:defRPr sz="4200"/>
             </a:lvl9pPr>
           </a:lstStyle>
           <a:p>
@@ -229,19 +222,13 @@
               <a:rPr lang="he-IL"/>
               <a:t>לחץ כדי לערוך סגנון כותרת משנה של תבנית בסיס</a:t>
             </a:r>
-            <a:endParaRPr lang="en-IL"/>
-          </a:p>
-        </p:txBody>
-      </p:sp>
-      <p:sp>
-        <p:nvSpPr>
-          <p:cNvPr id="4" name="מציין מיקום של תאריך 3">
-            <a:extLst>
-              <a:ext uri="{FF2B5EF4-FFF2-40B4-BE49-F238E27FC236}">
-                <a16:creationId xmlns:a16="http://schemas.microsoft.com/office/drawing/2014/main" id="{5CC11170-B0B6-4389-95F4-5C19B576009B}"/>
-              </a:ext>
-            </a:extLst>
-          </p:cNvPr>
+            <a:endParaRPr lang="en-US" dirty="0"/>
+          </a:p>
+        </p:txBody>
+      </p:sp>
+      <p:sp>
+        <p:nvSpPr>
+          <p:cNvPr id="4" name="Date Placeholder 3"/>
           <p:cNvSpPr>
             <a:spLocks noGrp="1"/>
           </p:cNvSpPr>
@@ -256,7 +243,7 @@
           <a:p>
             <a:fld id="{45FE9400-3064-4603-AB37-72E582AC0DEA}" type="datetimeFigureOut">
               <a:rPr lang="en-IL" smtClean="0"/>
-              <a:t>10/01/2021</a:t>
+              <a:t>11/01/2021</a:t>
             </a:fld>
             <a:endParaRPr lang="en-IL" dirty="0"/>
           </a:p>
@@ -264,13 +251,7 @@
       </p:sp>
       <p:sp>
         <p:nvSpPr>
-          <p:cNvPr id="5" name="מציין מיקום של כותרת תחתונה 4">
-            <a:extLst>
-              <a:ext uri="{FF2B5EF4-FFF2-40B4-BE49-F238E27FC236}">
-                <a16:creationId xmlns:a16="http://schemas.microsoft.com/office/drawing/2014/main" id="{2C732B03-AE22-4723-8DA9-F3302AD6213F}"/>
-              </a:ext>
-            </a:extLst>
-          </p:cNvPr>
+          <p:cNvPr id="5" name="Footer Placeholder 4"/>
           <p:cNvSpPr>
             <a:spLocks noGrp="1"/>
           </p:cNvSpPr>
@@ -289,13 +270,7 @@
       </p:sp>
       <p:sp>
         <p:nvSpPr>
-          <p:cNvPr id="6" name="מציין מיקום של מספר שקופית 5">
-            <a:extLst>
-              <a:ext uri="{FF2B5EF4-FFF2-40B4-BE49-F238E27FC236}">
-                <a16:creationId xmlns:a16="http://schemas.microsoft.com/office/drawing/2014/main" id="{76BD90F9-6960-4F0A-836B-53E66E09C95B}"/>
-              </a:ext>
-            </a:extLst>
-          </p:cNvPr>
+          <p:cNvPr id="6" name="Slide Number Placeholder 5"/>
           <p:cNvSpPr>
             <a:spLocks noGrp="1"/>
           </p:cNvSpPr>
@@ -319,7 +294,7 @@
     </p:spTree>
     <p:extLst>
       <p:ext uri="{BB962C8B-B14F-4D97-AF65-F5344CB8AC3E}">
-        <p14:creationId xmlns:p14="http://schemas.microsoft.com/office/powerpoint/2010/main" val="3342199036"/>
+        <p14:creationId xmlns:p14="http://schemas.microsoft.com/office/powerpoint/2010/main" val="2853011799"/>
       </p:ext>
     </p:extLst>
   </p:cSld>
@@ -348,13 +323,7 @@
       </p:grpSpPr>
       <p:sp>
         <p:nvSpPr>
-          <p:cNvPr id="2" name="כותרת 1">
-            <a:extLst>
-              <a:ext uri="{FF2B5EF4-FFF2-40B4-BE49-F238E27FC236}">
-                <a16:creationId xmlns:a16="http://schemas.microsoft.com/office/drawing/2014/main" id="{D4E5D503-EF7E-4E0C-9386-4693D4C01DF7}"/>
-              </a:ext>
-            </a:extLst>
-          </p:cNvPr>
+          <p:cNvPr id="2" name="Title 1"/>
           <p:cNvSpPr>
             <a:spLocks noGrp="1"/>
           </p:cNvSpPr>
@@ -371,19 +340,13 @@
               <a:rPr lang="he-IL"/>
               <a:t>לחץ כדי לערוך סגנון כותרת של תבנית בסיס</a:t>
             </a:r>
-            <a:endParaRPr lang="en-IL"/>
-          </a:p>
-        </p:txBody>
-      </p:sp>
-      <p:sp>
-        <p:nvSpPr>
-          <p:cNvPr id="3" name="מציין מיקום של טקסט אנכי 2">
-            <a:extLst>
-              <a:ext uri="{FF2B5EF4-FFF2-40B4-BE49-F238E27FC236}">
-                <a16:creationId xmlns:a16="http://schemas.microsoft.com/office/drawing/2014/main" id="{358F0C94-773C-46C2-A704-2A1FA2907628}"/>
-              </a:ext>
-            </a:extLst>
-          </p:cNvPr>
+            <a:endParaRPr lang="en-US" dirty="0"/>
+          </a:p>
+        </p:txBody>
+      </p:sp>
+      <p:sp>
+        <p:nvSpPr>
+          <p:cNvPr id="3" name="Vertical Text Placeholder 2"/>
           <p:cNvSpPr>
             <a:spLocks noGrp="1"/>
           </p:cNvSpPr>
@@ -429,19 +392,13 @@
               <a:rPr lang="he-IL"/>
               <a:t>רמה חמישית</a:t>
             </a:r>
-            <a:endParaRPr lang="en-IL"/>
-          </a:p>
-        </p:txBody>
-      </p:sp>
-      <p:sp>
-        <p:nvSpPr>
-          <p:cNvPr id="4" name="מציין מיקום של תאריך 3">
-            <a:extLst>
-              <a:ext uri="{FF2B5EF4-FFF2-40B4-BE49-F238E27FC236}">
-                <a16:creationId xmlns:a16="http://schemas.microsoft.com/office/drawing/2014/main" id="{BB656F50-7219-4744-B742-8F69D05211E3}"/>
-              </a:ext>
-            </a:extLst>
-          </p:cNvPr>
+            <a:endParaRPr lang="en-US" dirty="0"/>
+          </a:p>
+        </p:txBody>
+      </p:sp>
+      <p:sp>
+        <p:nvSpPr>
+          <p:cNvPr id="4" name="Date Placeholder 3"/>
           <p:cNvSpPr>
             <a:spLocks noGrp="1"/>
           </p:cNvSpPr>
@@ -456,7 +413,7 @@
           <a:p>
             <a:fld id="{45FE9400-3064-4603-AB37-72E582AC0DEA}" type="datetimeFigureOut">
               <a:rPr lang="en-IL" smtClean="0"/>
-              <a:t>10/01/2021</a:t>
+              <a:t>11/01/2021</a:t>
             </a:fld>
             <a:endParaRPr lang="en-IL" dirty="0"/>
           </a:p>
@@ -464,13 +421,7 @@
       </p:sp>
       <p:sp>
         <p:nvSpPr>
-          <p:cNvPr id="5" name="מציין מיקום של כותרת תחתונה 4">
-            <a:extLst>
-              <a:ext uri="{FF2B5EF4-FFF2-40B4-BE49-F238E27FC236}">
-                <a16:creationId xmlns:a16="http://schemas.microsoft.com/office/drawing/2014/main" id="{F86E2342-58AA-4BA6-B07F-E323DB8B43AD}"/>
-              </a:ext>
-            </a:extLst>
-          </p:cNvPr>
+          <p:cNvPr id="5" name="Footer Placeholder 4"/>
           <p:cNvSpPr>
             <a:spLocks noGrp="1"/>
           </p:cNvSpPr>
@@ -489,13 +440,7 @@
       </p:sp>
       <p:sp>
         <p:nvSpPr>
-          <p:cNvPr id="6" name="מציין מיקום של מספר שקופית 5">
-            <a:extLst>
-              <a:ext uri="{FF2B5EF4-FFF2-40B4-BE49-F238E27FC236}">
-                <a16:creationId xmlns:a16="http://schemas.microsoft.com/office/drawing/2014/main" id="{E4D24ABC-0A7E-4489-9B9D-BC8560B0D18A}"/>
-              </a:ext>
-            </a:extLst>
-          </p:cNvPr>
+          <p:cNvPr id="6" name="Slide Number Placeholder 5"/>
           <p:cNvSpPr>
             <a:spLocks noGrp="1"/>
           </p:cNvSpPr>
@@ -519,7 +464,7 @@
     </p:spTree>
     <p:extLst>
       <p:ext uri="{BB962C8B-B14F-4D97-AF65-F5344CB8AC3E}">
-        <p14:creationId xmlns:p14="http://schemas.microsoft.com/office/powerpoint/2010/main" val="1548716863"/>
+        <p14:creationId xmlns:p14="http://schemas.microsoft.com/office/powerpoint/2010/main" val="3522641132"/>
       </p:ext>
     </p:extLst>
   </p:cSld>
@@ -548,13 +493,7 @@
       </p:grpSpPr>
       <p:sp>
         <p:nvSpPr>
-          <p:cNvPr id="2" name="כותרת אנכית 1">
-            <a:extLst>
-              <a:ext uri="{FF2B5EF4-FFF2-40B4-BE49-F238E27FC236}">
-                <a16:creationId xmlns:a16="http://schemas.microsoft.com/office/drawing/2014/main" id="{468D1CFC-1E05-4C4A-B4BF-8B2A4F92165A}"/>
-              </a:ext>
-            </a:extLst>
-          </p:cNvPr>
+          <p:cNvPr id="2" name="Vertical Title 1"/>
           <p:cNvSpPr>
             <a:spLocks noGrp="1"/>
           </p:cNvSpPr>
@@ -564,8 +503,8 @@
         </p:nvSpPr>
         <p:spPr>
           <a:xfrm>
-            <a:off x="8724900" y="365125"/>
-            <a:ext cx="2628900" cy="5811838"/>
+            <a:off x="19322020" y="958369"/>
+            <a:ext cx="5821918" cy="15254730"/>
           </a:xfrm>
         </p:spPr>
         <p:txBody>
@@ -576,19 +515,13 @@
               <a:rPr lang="he-IL"/>
               <a:t>לחץ כדי לערוך סגנון כותרת של תבנית בסיס</a:t>
             </a:r>
-            <a:endParaRPr lang="en-IL"/>
-          </a:p>
-        </p:txBody>
-      </p:sp>
-      <p:sp>
-        <p:nvSpPr>
-          <p:cNvPr id="3" name="מציין מיקום של טקסט אנכי 2">
-            <a:extLst>
-              <a:ext uri="{FF2B5EF4-FFF2-40B4-BE49-F238E27FC236}">
-                <a16:creationId xmlns:a16="http://schemas.microsoft.com/office/drawing/2014/main" id="{D7E81157-112A-496A-86CF-698371DCCEDA}"/>
-              </a:ext>
-            </a:extLst>
-          </p:cNvPr>
+            <a:endParaRPr lang="en-US" dirty="0"/>
+          </a:p>
+        </p:txBody>
+      </p:sp>
+      <p:sp>
+        <p:nvSpPr>
+          <p:cNvPr id="3" name="Vertical Text Placeholder 2"/>
           <p:cNvSpPr>
             <a:spLocks noGrp="1"/>
           </p:cNvSpPr>
@@ -598,8 +531,8 @@
         </p:nvSpPr>
         <p:spPr>
           <a:xfrm>
-            <a:off x="838200" y="365125"/>
-            <a:ext cx="7734300" cy="5811838"/>
+            <a:off x="1856265" y="958369"/>
+            <a:ext cx="17128252" cy="15254730"/>
           </a:xfrm>
         </p:spPr>
         <p:txBody>
@@ -639,19 +572,13 @@
               <a:rPr lang="he-IL"/>
               <a:t>רמה חמישית</a:t>
             </a:r>
-            <a:endParaRPr lang="en-IL"/>
-          </a:p>
-        </p:txBody>
-      </p:sp>
-      <p:sp>
-        <p:nvSpPr>
-          <p:cNvPr id="4" name="מציין מיקום של תאריך 3">
-            <a:extLst>
-              <a:ext uri="{FF2B5EF4-FFF2-40B4-BE49-F238E27FC236}">
-                <a16:creationId xmlns:a16="http://schemas.microsoft.com/office/drawing/2014/main" id="{A183D733-0B97-4EA0-863A-FFB51125F61C}"/>
-              </a:ext>
-            </a:extLst>
-          </p:cNvPr>
+            <a:endParaRPr lang="en-US" dirty="0"/>
+          </a:p>
+        </p:txBody>
+      </p:sp>
+      <p:sp>
+        <p:nvSpPr>
+          <p:cNvPr id="4" name="Date Placeholder 3"/>
           <p:cNvSpPr>
             <a:spLocks noGrp="1"/>
           </p:cNvSpPr>
@@ -666,7 +593,7 @@
           <a:p>
             <a:fld id="{45FE9400-3064-4603-AB37-72E582AC0DEA}" type="datetimeFigureOut">
               <a:rPr lang="en-IL" smtClean="0"/>
-              <a:t>10/01/2021</a:t>
+              <a:t>11/01/2021</a:t>
             </a:fld>
             <a:endParaRPr lang="en-IL" dirty="0"/>
           </a:p>
@@ -674,13 +601,7 @@
       </p:sp>
       <p:sp>
         <p:nvSpPr>
-          <p:cNvPr id="5" name="מציין מיקום של כותרת תחתונה 4">
-            <a:extLst>
-              <a:ext uri="{FF2B5EF4-FFF2-40B4-BE49-F238E27FC236}">
-                <a16:creationId xmlns:a16="http://schemas.microsoft.com/office/drawing/2014/main" id="{13CAA023-70DB-4F1B-8D93-C72A2BCC7548}"/>
-              </a:ext>
-            </a:extLst>
-          </p:cNvPr>
+          <p:cNvPr id="5" name="Footer Placeholder 4"/>
           <p:cNvSpPr>
             <a:spLocks noGrp="1"/>
           </p:cNvSpPr>
@@ -699,13 +620,7 @@
       </p:sp>
       <p:sp>
         <p:nvSpPr>
-          <p:cNvPr id="6" name="מציין מיקום של מספר שקופית 5">
-            <a:extLst>
-              <a:ext uri="{FF2B5EF4-FFF2-40B4-BE49-F238E27FC236}">
-                <a16:creationId xmlns:a16="http://schemas.microsoft.com/office/drawing/2014/main" id="{FAA907E5-A028-4C00-A11E-21DD5582F230}"/>
-              </a:ext>
-            </a:extLst>
-          </p:cNvPr>
+          <p:cNvPr id="6" name="Slide Number Placeholder 5"/>
           <p:cNvSpPr>
             <a:spLocks noGrp="1"/>
           </p:cNvSpPr>
@@ -729,7 +644,7 @@
     </p:spTree>
     <p:extLst>
       <p:ext uri="{BB962C8B-B14F-4D97-AF65-F5344CB8AC3E}">
-        <p14:creationId xmlns:p14="http://schemas.microsoft.com/office/powerpoint/2010/main" val="2414205865"/>
+        <p14:creationId xmlns:p14="http://schemas.microsoft.com/office/powerpoint/2010/main" val="3934263437"/>
       </p:ext>
     </p:extLst>
   </p:cSld>
@@ -758,13 +673,7 @@
       </p:grpSpPr>
       <p:sp>
         <p:nvSpPr>
-          <p:cNvPr id="2" name="כותרת 1">
-            <a:extLst>
-              <a:ext uri="{FF2B5EF4-FFF2-40B4-BE49-F238E27FC236}">
-                <a16:creationId xmlns:a16="http://schemas.microsoft.com/office/drawing/2014/main" id="{082C3E23-051D-4D49-99FD-BEB4062A9E2B}"/>
-              </a:ext>
-            </a:extLst>
-          </p:cNvPr>
+          <p:cNvPr id="2" name="Title 1"/>
           <p:cNvSpPr>
             <a:spLocks noGrp="1"/>
           </p:cNvSpPr>
@@ -781,19 +690,13 @@
               <a:rPr lang="he-IL"/>
               <a:t>לחץ כדי לערוך סגנון כותרת של תבנית בסיס</a:t>
             </a:r>
-            <a:endParaRPr lang="en-IL"/>
-          </a:p>
-        </p:txBody>
-      </p:sp>
-      <p:sp>
-        <p:nvSpPr>
-          <p:cNvPr id="3" name="מציין מיקום תוכן 2">
-            <a:extLst>
-              <a:ext uri="{FF2B5EF4-FFF2-40B4-BE49-F238E27FC236}">
-                <a16:creationId xmlns:a16="http://schemas.microsoft.com/office/drawing/2014/main" id="{D445CE0B-82E8-4E74-BEFB-744D761C9795}"/>
-              </a:ext>
-            </a:extLst>
-          </p:cNvPr>
+            <a:endParaRPr lang="en-US" dirty="0"/>
+          </a:p>
+        </p:txBody>
+      </p:sp>
+      <p:sp>
+        <p:nvSpPr>
+          <p:cNvPr id="3" name="Content Placeholder 2"/>
           <p:cNvSpPr>
             <a:spLocks noGrp="1"/>
           </p:cNvSpPr>
@@ -839,19 +742,13 @@
               <a:rPr lang="he-IL"/>
               <a:t>רמה חמישית</a:t>
             </a:r>
-            <a:endParaRPr lang="en-IL"/>
-          </a:p>
-        </p:txBody>
-      </p:sp>
-      <p:sp>
-        <p:nvSpPr>
-          <p:cNvPr id="4" name="מציין מיקום של תאריך 3">
-            <a:extLst>
-              <a:ext uri="{FF2B5EF4-FFF2-40B4-BE49-F238E27FC236}">
-                <a16:creationId xmlns:a16="http://schemas.microsoft.com/office/drawing/2014/main" id="{547D4910-6A95-4E0A-88B6-E7933BCA91FD}"/>
-              </a:ext>
-            </a:extLst>
-          </p:cNvPr>
+            <a:endParaRPr lang="en-US" dirty="0"/>
+          </a:p>
+        </p:txBody>
+      </p:sp>
+      <p:sp>
+        <p:nvSpPr>
+          <p:cNvPr id="4" name="Date Placeholder 3"/>
           <p:cNvSpPr>
             <a:spLocks noGrp="1"/>
           </p:cNvSpPr>
@@ -866,7 +763,7 @@
           <a:p>
             <a:fld id="{45FE9400-3064-4603-AB37-72E582AC0DEA}" type="datetimeFigureOut">
               <a:rPr lang="en-IL" smtClean="0"/>
-              <a:t>10/01/2021</a:t>
+              <a:t>11/01/2021</a:t>
             </a:fld>
             <a:endParaRPr lang="en-IL" dirty="0"/>
           </a:p>
@@ -874,13 +771,7 @@
       </p:sp>
       <p:sp>
         <p:nvSpPr>
-          <p:cNvPr id="5" name="מציין מיקום של כותרת תחתונה 4">
-            <a:extLst>
-              <a:ext uri="{FF2B5EF4-FFF2-40B4-BE49-F238E27FC236}">
-                <a16:creationId xmlns:a16="http://schemas.microsoft.com/office/drawing/2014/main" id="{02E6668A-3F43-4D58-B6FE-6FA0203C2493}"/>
-              </a:ext>
-            </a:extLst>
-          </p:cNvPr>
+          <p:cNvPr id="5" name="Footer Placeholder 4"/>
           <p:cNvSpPr>
             <a:spLocks noGrp="1"/>
           </p:cNvSpPr>
@@ -899,13 +790,7 @@
       </p:sp>
       <p:sp>
         <p:nvSpPr>
-          <p:cNvPr id="6" name="מציין מיקום של מספר שקופית 5">
-            <a:extLst>
-              <a:ext uri="{FF2B5EF4-FFF2-40B4-BE49-F238E27FC236}">
-                <a16:creationId xmlns:a16="http://schemas.microsoft.com/office/drawing/2014/main" id="{5E533E86-4630-4165-AD01-23D97EC19C0D}"/>
-              </a:ext>
-            </a:extLst>
-          </p:cNvPr>
+          <p:cNvPr id="6" name="Slide Number Placeholder 5"/>
           <p:cNvSpPr>
             <a:spLocks noGrp="1"/>
           </p:cNvSpPr>
@@ -929,7 +814,7 @@
     </p:spTree>
     <p:extLst>
       <p:ext uri="{BB962C8B-B14F-4D97-AF65-F5344CB8AC3E}">
-        <p14:creationId xmlns:p14="http://schemas.microsoft.com/office/powerpoint/2010/main" val="2326125688"/>
+        <p14:creationId xmlns:p14="http://schemas.microsoft.com/office/powerpoint/2010/main" val="2955614080"/>
       </p:ext>
     </p:extLst>
   </p:cSld>
@@ -958,13 +843,7 @@
       </p:grpSpPr>
       <p:sp>
         <p:nvSpPr>
-          <p:cNvPr id="2" name="כותרת 1">
-            <a:extLst>
-              <a:ext uri="{FF2B5EF4-FFF2-40B4-BE49-F238E27FC236}">
-                <a16:creationId xmlns:a16="http://schemas.microsoft.com/office/drawing/2014/main" id="{E6F21A42-EE5D-425E-8552-C848064D9228}"/>
-              </a:ext>
-            </a:extLst>
-          </p:cNvPr>
+          <p:cNvPr id="2" name="Title 1"/>
           <p:cNvSpPr>
             <a:spLocks noGrp="1"/>
           </p:cNvSpPr>
@@ -974,15 +853,15 @@
         </p:nvSpPr>
         <p:spPr>
           <a:xfrm>
-            <a:off x="831850" y="1709738"/>
-            <a:ext cx="10515600" cy="2852737"/>
+            <a:off x="1842202" y="4487671"/>
+            <a:ext cx="23287673" cy="7487774"/>
           </a:xfrm>
         </p:spPr>
         <p:txBody>
           <a:bodyPr anchor="b"/>
           <a:lstStyle>
             <a:lvl1pPr>
-              <a:defRPr sz="6000"/>
+              <a:defRPr sz="15749"/>
             </a:lvl1pPr>
           </a:lstStyle>
           <a:p>
@@ -990,19 +869,13 @@
               <a:rPr lang="he-IL"/>
               <a:t>לחץ כדי לערוך סגנון כותרת של תבנית בסיס</a:t>
             </a:r>
-            <a:endParaRPr lang="en-IL"/>
-          </a:p>
-        </p:txBody>
-      </p:sp>
-      <p:sp>
-        <p:nvSpPr>
-          <p:cNvPr id="3" name="מציין מיקום טקסט 2">
-            <a:extLst>
-              <a:ext uri="{FF2B5EF4-FFF2-40B4-BE49-F238E27FC236}">
-                <a16:creationId xmlns:a16="http://schemas.microsoft.com/office/drawing/2014/main" id="{47832683-5371-4B44-BD1E-DA1D04FC6794}"/>
-              </a:ext>
-            </a:extLst>
-          </p:cNvPr>
+            <a:endParaRPr lang="en-US" dirty="0"/>
+          </a:p>
+        </p:txBody>
+      </p:sp>
+      <p:sp>
+        <p:nvSpPr>
+          <p:cNvPr id="3" name="Text Placeholder 2"/>
           <p:cNvSpPr>
             <a:spLocks noGrp="1"/>
           </p:cNvSpPr>
@@ -1012,8 +885,8 @@
         </p:nvSpPr>
         <p:spPr>
           <a:xfrm>
-            <a:off x="831850" y="4589463"/>
-            <a:ext cx="10515600" cy="1500187"/>
+            <a:off x="1842202" y="12046282"/>
+            <a:ext cx="23287673" cy="3937644"/>
           </a:xfrm>
         </p:spPr>
         <p:txBody>
@@ -1021,17 +894,15 @@
           <a:lstStyle>
             <a:lvl1pPr marL="0" indent="0">
               <a:buNone/>
-              <a:defRPr sz="2400">
+              <a:defRPr sz="6300">
                 <a:solidFill>
-                  <a:schemeClr val="tx1">
-                    <a:tint val="75000"/>
-                  </a:schemeClr>
+                  <a:schemeClr val="tx1"/>
                 </a:solidFill>
               </a:defRPr>
             </a:lvl1pPr>
-            <a:lvl2pPr marL="457200" indent="0">
-              <a:buNone/>
-              <a:defRPr sz="2000">
+            <a:lvl2pPr marL="1200059" indent="0">
+              <a:buNone/>
+              <a:defRPr sz="5250">
                 <a:solidFill>
                   <a:schemeClr val="tx1">
                     <a:tint val="75000"/>
@@ -1039,9 +910,9 @@
                 </a:solidFill>
               </a:defRPr>
             </a:lvl2pPr>
-            <a:lvl3pPr marL="914400" indent="0">
-              <a:buNone/>
-              <a:defRPr sz="1800">
+            <a:lvl3pPr marL="2400117" indent="0">
+              <a:buNone/>
+              <a:defRPr sz="4725">
                 <a:solidFill>
                   <a:schemeClr val="tx1">
                     <a:tint val="75000"/>
@@ -1049,9 +920,9 @@
                 </a:solidFill>
               </a:defRPr>
             </a:lvl3pPr>
-            <a:lvl4pPr marL="1371600" indent="0">
-              <a:buNone/>
-              <a:defRPr sz="1600">
+            <a:lvl4pPr marL="3600176" indent="0">
+              <a:buNone/>
+              <a:defRPr sz="4200">
                 <a:solidFill>
                   <a:schemeClr val="tx1">
                     <a:tint val="75000"/>
@@ -1059,9 +930,9 @@
                 </a:solidFill>
               </a:defRPr>
             </a:lvl4pPr>
-            <a:lvl5pPr marL="1828800" indent="0">
-              <a:buNone/>
-              <a:defRPr sz="1600">
+            <a:lvl5pPr marL="4800234" indent="0">
+              <a:buNone/>
+              <a:defRPr sz="4200">
                 <a:solidFill>
                   <a:schemeClr val="tx1">
                     <a:tint val="75000"/>
@@ -1069,9 +940,9 @@
                 </a:solidFill>
               </a:defRPr>
             </a:lvl5pPr>
-            <a:lvl6pPr marL="2286000" indent="0">
-              <a:buNone/>
-              <a:defRPr sz="1600">
+            <a:lvl6pPr marL="6000293" indent="0">
+              <a:buNone/>
+              <a:defRPr sz="4200">
                 <a:solidFill>
                   <a:schemeClr val="tx1">
                     <a:tint val="75000"/>
@@ -1079,9 +950,9 @@
                 </a:solidFill>
               </a:defRPr>
             </a:lvl6pPr>
-            <a:lvl7pPr marL="2743200" indent="0">
-              <a:buNone/>
-              <a:defRPr sz="1600">
+            <a:lvl7pPr marL="7200351" indent="0">
+              <a:buNone/>
+              <a:defRPr sz="4200">
                 <a:solidFill>
                   <a:schemeClr val="tx1">
                     <a:tint val="75000"/>
@@ -1089,9 +960,9 @@
                 </a:solidFill>
               </a:defRPr>
             </a:lvl7pPr>
-            <a:lvl8pPr marL="3200400" indent="0">
-              <a:buNone/>
-              <a:defRPr sz="1600">
+            <a:lvl8pPr marL="8400410" indent="0">
+              <a:buNone/>
+              <a:defRPr sz="4200">
                 <a:solidFill>
                   <a:schemeClr val="tx1">
                     <a:tint val="75000"/>
@@ -1099,9 +970,9 @@
                 </a:solidFill>
               </a:defRPr>
             </a:lvl8pPr>
-            <a:lvl9pPr marL="3657600" indent="0">
-              <a:buNone/>
-              <a:defRPr sz="1600">
+            <a:lvl9pPr marL="9600468" indent="0">
+              <a:buNone/>
+              <a:defRPr sz="4200">
                 <a:solidFill>
                   <a:schemeClr val="tx1">
                     <a:tint val="75000"/>
@@ -1121,13 +992,7 @@
       </p:sp>
       <p:sp>
         <p:nvSpPr>
-          <p:cNvPr id="4" name="מציין מיקום של תאריך 3">
-            <a:extLst>
-              <a:ext uri="{FF2B5EF4-FFF2-40B4-BE49-F238E27FC236}">
-                <a16:creationId xmlns:a16="http://schemas.microsoft.com/office/drawing/2014/main" id="{887A6720-8561-4C70-B646-EE2CDD92E1FE}"/>
-              </a:ext>
-            </a:extLst>
-          </p:cNvPr>
+          <p:cNvPr id="4" name="Date Placeholder 3"/>
           <p:cNvSpPr>
             <a:spLocks noGrp="1"/>
           </p:cNvSpPr>
@@ -1142,7 +1007,7 @@
           <a:p>
             <a:fld id="{45FE9400-3064-4603-AB37-72E582AC0DEA}" type="datetimeFigureOut">
               <a:rPr lang="en-IL" smtClean="0"/>
-              <a:t>10/01/2021</a:t>
+              <a:t>11/01/2021</a:t>
             </a:fld>
             <a:endParaRPr lang="en-IL" dirty="0"/>
           </a:p>
@@ -1150,13 +1015,7 @@
       </p:sp>
       <p:sp>
         <p:nvSpPr>
-          <p:cNvPr id="5" name="מציין מיקום של כותרת תחתונה 4">
-            <a:extLst>
-              <a:ext uri="{FF2B5EF4-FFF2-40B4-BE49-F238E27FC236}">
-                <a16:creationId xmlns:a16="http://schemas.microsoft.com/office/drawing/2014/main" id="{B5135F23-CEF8-46CB-8438-A2285F9CB9F4}"/>
-              </a:ext>
-            </a:extLst>
-          </p:cNvPr>
+          <p:cNvPr id="5" name="Footer Placeholder 4"/>
           <p:cNvSpPr>
             <a:spLocks noGrp="1"/>
           </p:cNvSpPr>
@@ -1175,13 +1034,7 @@
       </p:sp>
       <p:sp>
         <p:nvSpPr>
-          <p:cNvPr id="6" name="מציין מיקום של מספר שקופית 5">
-            <a:extLst>
-              <a:ext uri="{FF2B5EF4-FFF2-40B4-BE49-F238E27FC236}">
-                <a16:creationId xmlns:a16="http://schemas.microsoft.com/office/drawing/2014/main" id="{9466572D-2E14-4D25-A646-8B3709E7F02A}"/>
-              </a:ext>
-            </a:extLst>
-          </p:cNvPr>
+          <p:cNvPr id="6" name="Slide Number Placeholder 5"/>
           <p:cNvSpPr>
             <a:spLocks noGrp="1"/>
           </p:cNvSpPr>
@@ -1205,7 +1058,7 @@
     </p:spTree>
     <p:extLst>
       <p:ext uri="{BB962C8B-B14F-4D97-AF65-F5344CB8AC3E}">
-        <p14:creationId xmlns:p14="http://schemas.microsoft.com/office/powerpoint/2010/main" val="3701216134"/>
+        <p14:creationId xmlns:p14="http://schemas.microsoft.com/office/powerpoint/2010/main" val="541466035"/>
       </p:ext>
     </p:extLst>
   </p:cSld>
@@ -1234,13 +1087,7 @@
       </p:grpSpPr>
       <p:sp>
         <p:nvSpPr>
-          <p:cNvPr id="2" name="כותרת 1">
-            <a:extLst>
-              <a:ext uri="{FF2B5EF4-FFF2-40B4-BE49-F238E27FC236}">
-                <a16:creationId xmlns:a16="http://schemas.microsoft.com/office/drawing/2014/main" id="{5AD7D3FF-96DC-4F7E-9AA5-65B3F7589F10}"/>
-              </a:ext>
-            </a:extLst>
-          </p:cNvPr>
+          <p:cNvPr id="2" name="Title 1"/>
           <p:cNvSpPr>
             <a:spLocks noGrp="1"/>
           </p:cNvSpPr>
@@ -1257,19 +1104,13 @@
               <a:rPr lang="he-IL"/>
               <a:t>לחץ כדי לערוך סגנון כותרת של תבנית בסיס</a:t>
             </a:r>
-            <a:endParaRPr lang="en-IL"/>
-          </a:p>
-        </p:txBody>
-      </p:sp>
-      <p:sp>
-        <p:nvSpPr>
-          <p:cNvPr id="3" name="מציין מיקום תוכן 2">
-            <a:extLst>
-              <a:ext uri="{FF2B5EF4-FFF2-40B4-BE49-F238E27FC236}">
-                <a16:creationId xmlns:a16="http://schemas.microsoft.com/office/drawing/2014/main" id="{6C1B2DED-21D6-4A00-945C-AA36D77337C6}"/>
-              </a:ext>
-            </a:extLst>
-          </p:cNvPr>
+            <a:endParaRPr lang="en-US" dirty="0"/>
+          </a:p>
+        </p:txBody>
+      </p:sp>
+      <p:sp>
+        <p:nvSpPr>
+          <p:cNvPr id="3" name="Content Placeholder 2"/>
           <p:cNvSpPr>
             <a:spLocks noGrp="1"/>
           </p:cNvSpPr>
@@ -1279,8 +1120,8 @@
         </p:nvSpPr>
         <p:spPr>
           <a:xfrm>
-            <a:off x="838200" y="1825625"/>
-            <a:ext cx="5181600" cy="4351338"/>
+            <a:off x="1856264" y="4791843"/>
+            <a:ext cx="11475085" cy="11421255"/>
           </a:xfrm>
         </p:spPr>
         <p:txBody>
@@ -1320,19 +1161,13 @@
               <a:rPr lang="he-IL"/>
               <a:t>רמה חמישית</a:t>
             </a:r>
-            <a:endParaRPr lang="en-IL"/>
-          </a:p>
-        </p:txBody>
-      </p:sp>
-      <p:sp>
-        <p:nvSpPr>
-          <p:cNvPr id="4" name="מציין מיקום תוכן 3">
-            <a:extLst>
-              <a:ext uri="{FF2B5EF4-FFF2-40B4-BE49-F238E27FC236}">
-                <a16:creationId xmlns:a16="http://schemas.microsoft.com/office/drawing/2014/main" id="{8FEA4293-7489-4DB1-898B-B9D2BF7B2CD1}"/>
-              </a:ext>
-            </a:extLst>
-          </p:cNvPr>
+            <a:endParaRPr lang="en-US" dirty="0"/>
+          </a:p>
+        </p:txBody>
+      </p:sp>
+      <p:sp>
+        <p:nvSpPr>
+          <p:cNvPr id="4" name="Content Placeholder 3"/>
           <p:cNvSpPr>
             <a:spLocks noGrp="1"/>
           </p:cNvSpPr>
@@ -1342,8 +1177,8 @@
         </p:nvSpPr>
         <p:spPr>
           <a:xfrm>
-            <a:off x="6172200" y="1825625"/>
-            <a:ext cx="5181600" cy="4351338"/>
+            <a:off x="13668851" y="4791843"/>
+            <a:ext cx="11475085" cy="11421255"/>
           </a:xfrm>
         </p:spPr>
         <p:txBody>
@@ -1383,19 +1218,13 @@
               <a:rPr lang="he-IL"/>
               <a:t>רמה חמישית</a:t>
             </a:r>
-            <a:endParaRPr lang="en-IL"/>
-          </a:p>
-        </p:txBody>
-      </p:sp>
-      <p:sp>
-        <p:nvSpPr>
-          <p:cNvPr id="5" name="מציין מיקום של תאריך 4">
-            <a:extLst>
-              <a:ext uri="{FF2B5EF4-FFF2-40B4-BE49-F238E27FC236}">
-                <a16:creationId xmlns:a16="http://schemas.microsoft.com/office/drawing/2014/main" id="{0123F930-17B0-4B51-A2F4-C62DEFB336F2}"/>
-              </a:ext>
-            </a:extLst>
-          </p:cNvPr>
+            <a:endParaRPr lang="en-US" dirty="0"/>
+          </a:p>
+        </p:txBody>
+      </p:sp>
+      <p:sp>
+        <p:nvSpPr>
+          <p:cNvPr id="5" name="Date Placeholder 4"/>
           <p:cNvSpPr>
             <a:spLocks noGrp="1"/>
           </p:cNvSpPr>
@@ -1410,7 +1239,7 @@
           <a:p>
             <a:fld id="{45FE9400-3064-4603-AB37-72E582AC0DEA}" type="datetimeFigureOut">
               <a:rPr lang="en-IL" smtClean="0"/>
-              <a:t>10/01/2021</a:t>
+              <a:t>11/01/2021</a:t>
             </a:fld>
             <a:endParaRPr lang="en-IL" dirty="0"/>
           </a:p>
@@ -1418,13 +1247,7 @@
       </p:sp>
       <p:sp>
         <p:nvSpPr>
-          <p:cNvPr id="6" name="מציין מיקום של כותרת תחתונה 5">
-            <a:extLst>
-              <a:ext uri="{FF2B5EF4-FFF2-40B4-BE49-F238E27FC236}">
-                <a16:creationId xmlns:a16="http://schemas.microsoft.com/office/drawing/2014/main" id="{5B17330B-09EA-4213-8E33-8FCD3F23467D}"/>
-              </a:ext>
-            </a:extLst>
-          </p:cNvPr>
+          <p:cNvPr id="6" name="Footer Placeholder 5"/>
           <p:cNvSpPr>
             <a:spLocks noGrp="1"/>
           </p:cNvSpPr>
@@ -1443,13 +1266,7 @@
       </p:sp>
       <p:sp>
         <p:nvSpPr>
-          <p:cNvPr id="7" name="מציין מיקום של מספר שקופית 6">
-            <a:extLst>
-              <a:ext uri="{FF2B5EF4-FFF2-40B4-BE49-F238E27FC236}">
-                <a16:creationId xmlns:a16="http://schemas.microsoft.com/office/drawing/2014/main" id="{C2722232-856F-42C3-B9B3-7F2B5D5299B6}"/>
-              </a:ext>
-            </a:extLst>
-          </p:cNvPr>
+          <p:cNvPr id="7" name="Slide Number Placeholder 6"/>
           <p:cNvSpPr>
             <a:spLocks noGrp="1"/>
           </p:cNvSpPr>
@@ -1473,7 +1290,7 @@
     </p:spTree>
     <p:extLst>
       <p:ext uri="{BB962C8B-B14F-4D97-AF65-F5344CB8AC3E}">
-        <p14:creationId xmlns:p14="http://schemas.microsoft.com/office/powerpoint/2010/main" val="2920624548"/>
+        <p14:creationId xmlns:p14="http://schemas.microsoft.com/office/powerpoint/2010/main" val="1852608587"/>
       </p:ext>
     </p:extLst>
   </p:cSld>
@@ -1502,13 +1319,7 @@
       </p:grpSpPr>
       <p:sp>
         <p:nvSpPr>
-          <p:cNvPr id="2" name="כותרת 1">
-            <a:extLst>
-              <a:ext uri="{FF2B5EF4-FFF2-40B4-BE49-F238E27FC236}">
-                <a16:creationId xmlns:a16="http://schemas.microsoft.com/office/drawing/2014/main" id="{5B6F3349-2921-4E68-BC10-1851DEDCF1BC}"/>
-              </a:ext>
-            </a:extLst>
-          </p:cNvPr>
+          <p:cNvPr id="2" name="Title 1"/>
           <p:cNvSpPr>
             <a:spLocks noGrp="1"/>
           </p:cNvSpPr>
@@ -1518,8 +1329,8 @@
         </p:nvSpPr>
         <p:spPr>
           <a:xfrm>
-            <a:off x="839788" y="365125"/>
-            <a:ext cx="10515600" cy="1325563"/>
+            <a:off x="1859780" y="958373"/>
+            <a:ext cx="23287673" cy="3479296"/>
           </a:xfrm>
         </p:spPr>
         <p:txBody>
@@ -1530,19 +1341,13 @@
               <a:rPr lang="he-IL"/>
               <a:t>לחץ כדי לערוך סגנון כותרת של תבנית בסיס</a:t>
             </a:r>
-            <a:endParaRPr lang="en-IL"/>
-          </a:p>
-        </p:txBody>
-      </p:sp>
-      <p:sp>
-        <p:nvSpPr>
-          <p:cNvPr id="3" name="מציין מיקום טקסט 2">
-            <a:extLst>
-              <a:ext uri="{FF2B5EF4-FFF2-40B4-BE49-F238E27FC236}">
-                <a16:creationId xmlns:a16="http://schemas.microsoft.com/office/drawing/2014/main" id="{08514058-E231-4C18-A7D7-4D9FD9DB5652}"/>
-              </a:ext>
-            </a:extLst>
-          </p:cNvPr>
+            <a:endParaRPr lang="en-US" dirty="0"/>
+          </a:p>
+        </p:txBody>
+      </p:sp>
+      <p:sp>
+        <p:nvSpPr>
+          <p:cNvPr id="3" name="Text Placeholder 2"/>
           <p:cNvSpPr>
             <a:spLocks noGrp="1"/>
           </p:cNvSpPr>
@@ -1552,8 +1357,8 @@
         </p:nvSpPr>
         <p:spPr>
           <a:xfrm>
-            <a:off x="839788" y="1681163"/>
-            <a:ext cx="5157787" cy="823912"/>
+            <a:off x="1859784" y="4412664"/>
+            <a:ext cx="11422348" cy="2162578"/>
           </a:xfrm>
         </p:spPr>
         <p:txBody>
@@ -1561,39 +1366,39 @@
           <a:lstStyle>
             <a:lvl1pPr marL="0" indent="0">
               <a:buNone/>
-              <a:defRPr sz="2400" b="1"/>
+              <a:defRPr sz="6300" b="1"/>
             </a:lvl1pPr>
-            <a:lvl2pPr marL="457200" indent="0">
-              <a:buNone/>
-              <a:defRPr sz="2000" b="1"/>
+            <a:lvl2pPr marL="1200059" indent="0">
+              <a:buNone/>
+              <a:defRPr sz="5250" b="1"/>
             </a:lvl2pPr>
-            <a:lvl3pPr marL="914400" indent="0">
-              <a:buNone/>
-              <a:defRPr sz="1800" b="1"/>
+            <a:lvl3pPr marL="2400117" indent="0">
+              <a:buNone/>
+              <a:defRPr sz="4725" b="1"/>
             </a:lvl3pPr>
-            <a:lvl4pPr marL="1371600" indent="0">
-              <a:buNone/>
-              <a:defRPr sz="1600" b="1"/>
+            <a:lvl4pPr marL="3600176" indent="0">
+              <a:buNone/>
+              <a:defRPr sz="4200" b="1"/>
             </a:lvl4pPr>
-            <a:lvl5pPr marL="1828800" indent="0">
-              <a:buNone/>
-              <a:defRPr sz="1600" b="1"/>
+            <a:lvl5pPr marL="4800234" indent="0">
+              <a:buNone/>
+              <a:defRPr sz="4200" b="1"/>
             </a:lvl5pPr>
-            <a:lvl6pPr marL="2286000" indent="0">
-              <a:buNone/>
-              <a:defRPr sz="1600" b="1"/>
+            <a:lvl6pPr marL="6000293" indent="0">
+              <a:buNone/>
+              <a:defRPr sz="4200" b="1"/>
             </a:lvl6pPr>
-            <a:lvl7pPr marL="2743200" indent="0">
-              <a:buNone/>
-              <a:defRPr sz="1600" b="1"/>
+            <a:lvl7pPr marL="7200351" indent="0">
+              <a:buNone/>
+              <a:defRPr sz="4200" b="1"/>
             </a:lvl7pPr>
-            <a:lvl8pPr marL="3200400" indent="0">
-              <a:buNone/>
-              <a:defRPr sz="1600" b="1"/>
+            <a:lvl8pPr marL="8400410" indent="0">
+              <a:buNone/>
+              <a:defRPr sz="4200" b="1"/>
             </a:lvl8pPr>
-            <a:lvl9pPr marL="3657600" indent="0">
-              <a:buNone/>
-              <a:defRPr sz="1600" b="1"/>
+            <a:lvl9pPr marL="9600468" indent="0">
+              <a:buNone/>
+              <a:defRPr sz="4200" b="1"/>
             </a:lvl9pPr>
           </a:lstStyle>
           <a:p>
@@ -1607,13 +1412,7 @@
       </p:sp>
       <p:sp>
         <p:nvSpPr>
-          <p:cNvPr id="4" name="מציין מיקום תוכן 3">
-            <a:extLst>
-              <a:ext uri="{FF2B5EF4-FFF2-40B4-BE49-F238E27FC236}">
-                <a16:creationId xmlns:a16="http://schemas.microsoft.com/office/drawing/2014/main" id="{8FBA4E61-F212-4997-AC42-D2B3EF2EF39F}"/>
-              </a:ext>
-            </a:extLst>
-          </p:cNvPr>
+          <p:cNvPr id="4" name="Content Placeholder 3"/>
           <p:cNvSpPr>
             <a:spLocks noGrp="1"/>
           </p:cNvSpPr>
@@ -1623,8 +1422,8 @@
         </p:nvSpPr>
         <p:spPr>
           <a:xfrm>
-            <a:off x="839788" y="2505075"/>
-            <a:ext cx="5157787" cy="3684588"/>
+            <a:off x="1859784" y="6575242"/>
+            <a:ext cx="11422348" cy="9671191"/>
           </a:xfrm>
         </p:spPr>
         <p:txBody>
@@ -1664,19 +1463,13 @@
               <a:rPr lang="he-IL"/>
               <a:t>רמה חמישית</a:t>
             </a:r>
-            <a:endParaRPr lang="en-IL"/>
-          </a:p>
-        </p:txBody>
-      </p:sp>
-      <p:sp>
-        <p:nvSpPr>
-          <p:cNvPr id="5" name="מציין מיקום טקסט 4">
-            <a:extLst>
-              <a:ext uri="{FF2B5EF4-FFF2-40B4-BE49-F238E27FC236}">
-                <a16:creationId xmlns:a16="http://schemas.microsoft.com/office/drawing/2014/main" id="{853ABBCC-0F0C-4C0E-9493-5CC4A06DCE2C}"/>
-              </a:ext>
-            </a:extLst>
-          </p:cNvPr>
+            <a:endParaRPr lang="en-US" dirty="0"/>
+          </a:p>
+        </p:txBody>
+      </p:sp>
+      <p:sp>
+        <p:nvSpPr>
+          <p:cNvPr id="5" name="Text Placeholder 4"/>
           <p:cNvSpPr>
             <a:spLocks noGrp="1"/>
           </p:cNvSpPr>
@@ -1686,8 +1479,8 @@
         </p:nvSpPr>
         <p:spPr>
           <a:xfrm>
-            <a:off x="6172200" y="1681163"/>
-            <a:ext cx="5183188" cy="823912"/>
+            <a:off x="13668853" y="4412664"/>
+            <a:ext cx="11478602" cy="2162578"/>
           </a:xfrm>
         </p:spPr>
         <p:txBody>
@@ -1695,39 +1488,39 @@
           <a:lstStyle>
             <a:lvl1pPr marL="0" indent="0">
               <a:buNone/>
-              <a:defRPr sz="2400" b="1"/>
+              <a:defRPr sz="6300" b="1"/>
             </a:lvl1pPr>
-            <a:lvl2pPr marL="457200" indent="0">
-              <a:buNone/>
-              <a:defRPr sz="2000" b="1"/>
+            <a:lvl2pPr marL="1200059" indent="0">
+              <a:buNone/>
+              <a:defRPr sz="5250" b="1"/>
             </a:lvl2pPr>
-            <a:lvl3pPr marL="914400" indent="0">
-              <a:buNone/>
-              <a:defRPr sz="1800" b="1"/>
+            <a:lvl3pPr marL="2400117" indent="0">
+              <a:buNone/>
+              <a:defRPr sz="4725" b="1"/>
             </a:lvl3pPr>
-            <a:lvl4pPr marL="1371600" indent="0">
-              <a:buNone/>
-              <a:defRPr sz="1600" b="1"/>
+            <a:lvl4pPr marL="3600176" indent="0">
+              <a:buNone/>
+              <a:defRPr sz="4200" b="1"/>
             </a:lvl4pPr>
-            <a:lvl5pPr marL="1828800" indent="0">
-              <a:buNone/>
-              <a:defRPr sz="1600" b="1"/>
+            <a:lvl5pPr marL="4800234" indent="0">
+              <a:buNone/>
+              <a:defRPr sz="4200" b="1"/>
             </a:lvl5pPr>
-            <a:lvl6pPr marL="2286000" indent="0">
-              <a:buNone/>
-              <a:defRPr sz="1600" b="1"/>
+            <a:lvl6pPr marL="6000293" indent="0">
+              <a:buNone/>
+              <a:defRPr sz="4200" b="1"/>
             </a:lvl6pPr>
-            <a:lvl7pPr marL="2743200" indent="0">
-              <a:buNone/>
-              <a:defRPr sz="1600" b="1"/>
+            <a:lvl7pPr marL="7200351" indent="0">
+              <a:buNone/>
+              <a:defRPr sz="4200" b="1"/>
             </a:lvl7pPr>
-            <a:lvl8pPr marL="3200400" indent="0">
-              <a:buNone/>
-              <a:defRPr sz="1600" b="1"/>
+            <a:lvl8pPr marL="8400410" indent="0">
+              <a:buNone/>
+              <a:defRPr sz="4200" b="1"/>
             </a:lvl8pPr>
-            <a:lvl9pPr marL="3657600" indent="0">
-              <a:buNone/>
-              <a:defRPr sz="1600" b="1"/>
+            <a:lvl9pPr marL="9600468" indent="0">
+              <a:buNone/>
+              <a:defRPr sz="4200" b="1"/>
             </a:lvl9pPr>
           </a:lstStyle>
           <a:p>
@@ -1741,13 +1534,7 @@
       </p:sp>
       <p:sp>
         <p:nvSpPr>
-          <p:cNvPr id="6" name="מציין מיקום תוכן 5">
-            <a:extLst>
-              <a:ext uri="{FF2B5EF4-FFF2-40B4-BE49-F238E27FC236}">
-                <a16:creationId xmlns:a16="http://schemas.microsoft.com/office/drawing/2014/main" id="{883906AF-B66C-4021-BE31-98E450E80F30}"/>
-              </a:ext>
-            </a:extLst>
-          </p:cNvPr>
+          <p:cNvPr id="6" name="Content Placeholder 5"/>
           <p:cNvSpPr>
             <a:spLocks noGrp="1"/>
           </p:cNvSpPr>
@@ -1757,8 +1544,8 @@
         </p:nvSpPr>
         <p:spPr>
           <a:xfrm>
-            <a:off x="6172200" y="2505075"/>
-            <a:ext cx="5183188" cy="3684588"/>
+            <a:off x="13668853" y="6575242"/>
+            <a:ext cx="11478602" cy="9671191"/>
           </a:xfrm>
         </p:spPr>
         <p:txBody>
@@ -1798,19 +1585,13 @@
               <a:rPr lang="he-IL"/>
               <a:t>רמה חמישית</a:t>
             </a:r>
-            <a:endParaRPr lang="en-IL"/>
-          </a:p>
-        </p:txBody>
-      </p:sp>
-      <p:sp>
-        <p:nvSpPr>
-          <p:cNvPr id="7" name="מציין מיקום של תאריך 6">
-            <a:extLst>
-              <a:ext uri="{FF2B5EF4-FFF2-40B4-BE49-F238E27FC236}">
-                <a16:creationId xmlns:a16="http://schemas.microsoft.com/office/drawing/2014/main" id="{9D86FB08-3F52-46DC-9F79-93F592337AAF}"/>
-              </a:ext>
-            </a:extLst>
-          </p:cNvPr>
+            <a:endParaRPr lang="en-US" dirty="0"/>
+          </a:p>
+        </p:txBody>
+      </p:sp>
+      <p:sp>
+        <p:nvSpPr>
+          <p:cNvPr id="7" name="Date Placeholder 6"/>
           <p:cNvSpPr>
             <a:spLocks noGrp="1"/>
           </p:cNvSpPr>
@@ -1825,7 +1606,7 @@
           <a:p>
             <a:fld id="{45FE9400-3064-4603-AB37-72E582AC0DEA}" type="datetimeFigureOut">
               <a:rPr lang="en-IL" smtClean="0"/>
-              <a:t>10/01/2021</a:t>
+              <a:t>11/01/2021</a:t>
             </a:fld>
             <a:endParaRPr lang="en-IL" dirty="0"/>
           </a:p>
@@ -1833,13 +1614,7 @@
       </p:sp>
       <p:sp>
         <p:nvSpPr>
-          <p:cNvPr id="8" name="מציין מיקום של כותרת תחתונה 7">
-            <a:extLst>
-              <a:ext uri="{FF2B5EF4-FFF2-40B4-BE49-F238E27FC236}">
-                <a16:creationId xmlns:a16="http://schemas.microsoft.com/office/drawing/2014/main" id="{DD888920-3BE6-48E5-8F5E-8ABF03AA63B0}"/>
-              </a:ext>
-            </a:extLst>
-          </p:cNvPr>
+          <p:cNvPr id="8" name="Footer Placeholder 7"/>
           <p:cNvSpPr>
             <a:spLocks noGrp="1"/>
           </p:cNvSpPr>
@@ -1858,13 +1633,7 @@
       </p:sp>
       <p:sp>
         <p:nvSpPr>
-          <p:cNvPr id="9" name="מציין מיקום של מספר שקופית 8">
-            <a:extLst>
-              <a:ext uri="{FF2B5EF4-FFF2-40B4-BE49-F238E27FC236}">
-                <a16:creationId xmlns:a16="http://schemas.microsoft.com/office/drawing/2014/main" id="{83857769-48EE-4F2D-81A8-3B347539A4E4}"/>
-              </a:ext>
-            </a:extLst>
-          </p:cNvPr>
+          <p:cNvPr id="9" name="Slide Number Placeholder 8"/>
           <p:cNvSpPr>
             <a:spLocks noGrp="1"/>
           </p:cNvSpPr>
@@ -1888,7 +1657,7 @@
     </p:spTree>
     <p:extLst>
       <p:ext uri="{BB962C8B-B14F-4D97-AF65-F5344CB8AC3E}">
-        <p14:creationId xmlns:p14="http://schemas.microsoft.com/office/powerpoint/2010/main" val="2824986380"/>
+        <p14:creationId xmlns:p14="http://schemas.microsoft.com/office/powerpoint/2010/main" val="2520038192"/>
       </p:ext>
     </p:extLst>
   </p:cSld>
@@ -1917,13 +1686,7 @@
       </p:grpSpPr>
       <p:sp>
         <p:nvSpPr>
-          <p:cNvPr id="2" name="כותרת 1">
-            <a:extLst>
-              <a:ext uri="{FF2B5EF4-FFF2-40B4-BE49-F238E27FC236}">
-                <a16:creationId xmlns:a16="http://schemas.microsoft.com/office/drawing/2014/main" id="{4894A085-4578-43C4-B660-B23B366C41C6}"/>
-              </a:ext>
-            </a:extLst>
-          </p:cNvPr>
+          <p:cNvPr id="2" name="Title 1"/>
           <p:cNvSpPr>
             <a:spLocks noGrp="1"/>
           </p:cNvSpPr>
@@ -1940,19 +1703,13 @@
               <a:rPr lang="he-IL"/>
               <a:t>לחץ כדי לערוך סגנון כותרת של תבנית בסיס</a:t>
             </a:r>
-            <a:endParaRPr lang="en-IL"/>
-          </a:p>
-        </p:txBody>
-      </p:sp>
-      <p:sp>
-        <p:nvSpPr>
-          <p:cNvPr id="3" name="מציין מיקום של תאריך 2">
-            <a:extLst>
-              <a:ext uri="{FF2B5EF4-FFF2-40B4-BE49-F238E27FC236}">
-                <a16:creationId xmlns:a16="http://schemas.microsoft.com/office/drawing/2014/main" id="{8CC76A38-17F5-4676-A523-4BCC0FD7449B}"/>
-              </a:ext>
-            </a:extLst>
-          </p:cNvPr>
+            <a:endParaRPr lang="en-US" dirty="0"/>
+          </a:p>
+        </p:txBody>
+      </p:sp>
+      <p:sp>
+        <p:nvSpPr>
+          <p:cNvPr id="3" name="Date Placeholder 2"/>
           <p:cNvSpPr>
             <a:spLocks noGrp="1"/>
           </p:cNvSpPr>
@@ -1967,7 +1724,7 @@
           <a:p>
             <a:fld id="{45FE9400-3064-4603-AB37-72E582AC0DEA}" type="datetimeFigureOut">
               <a:rPr lang="en-IL" smtClean="0"/>
-              <a:t>10/01/2021</a:t>
+              <a:t>11/01/2021</a:t>
             </a:fld>
             <a:endParaRPr lang="en-IL" dirty="0"/>
           </a:p>
@@ -1975,13 +1732,7 @@
       </p:sp>
       <p:sp>
         <p:nvSpPr>
-          <p:cNvPr id="4" name="מציין מיקום של כותרת תחתונה 3">
-            <a:extLst>
-              <a:ext uri="{FF2B5EF4-FFF2-40B4-BE49-F238E27FC236}">
-                <a16:creationId xmlns:a16="http://schemas.microsoft.com/office/drawing/2014/main" id="{09414B2A-81F8-4F77-9EC8-B647CB48B306}"/>
-              </a:ext>
-            </a:extLst>
-          </p:cNvPr>
+          <p:cNvPr id="4" name="Footer Placeholder 3"/>
           <p:cNvSpPr>
             <a:spLocks noGrp="1"/>
           </p:cNvSpPr>
@@ -2000,13 +1751,7 @@
       </p:sp>
       <p:sp>
         <p:nvSpPr>
-          <p:cNvPr id="5" name="מציין מיקום של מספר שקופית 4">
-            <a:extLst>
-              <a:ext uri="{FF2B5EF4-FFF2-40B4-BE49-F238E27FC236}">
-                <a16:creationId xmlns:a16="http://schemas.microsoft.com/office/drawing/2014/main" id="{4A63CB9C-878C-4F7F-BB78-ED4342692FC5}"/>
-              </a:ext>
-            </a:extLst>
-          </p:cNvPr>
+          <p:cNvPr id="5" name="Slide Number Placeholder 4"/>
           <p:cNvSpPr>
             <a:spLocks noGrp="1"/>
           </p:cNvSpPr>
@@ -2030,7 +1775,7 @@
     </p:spTree>
     <p:extLst>
       <p:ext uri="{BB962C8B-B14F-4D97-AF65-F5344CB8AC3E}">
-        <p14:creationId xmlns:p14="http://schemas.microsoft.com/office/powerpoint/2010/main" val="3918727032"/>
+        <p14:creationId xmlns:p14="http://schemas.microsoft.com/office/powerpoint/2010/main" val="254014180"/>
       </p:ext>
     </p:extLst>
   </p:cSld>
@@ -2059,13 +1804,7 @@
       </p:grpSpPr>
       <p:sp>
         <p:nvSpPr>
-          <p:cNvPr id="2" name="מציין מיקום של תאריך 1">
-            <a:extLst>
-              <a:ext uri="{FF2B5EF4-FFF2-40B4-BE49-F238E27FC236}">
-                <a16:creationId xmlns:a16="http://schemas.microsoft.com/office/drawing/2014/main" id="{3102751C-CBE3-4356-804B-92468D0D9D64}"/>
-              </a:ext>
-            </a:extLst>
-          </p:cNvPr>
+          <p:cNvPr id="2" name="Date Placeholder 1"/>
           <p:cNvSpPr>
             <a:spLocks noGrp="1"/>
           </p:cNvSpPr>
@@ -2080,7 +1819,7 @@
           <a:p>
             <a:fld id="{45FE9400-3064-4603-AB37-72E582AC0DEA}" type="datetimeFigureOut">
               <a:rPr lang="en-IL" smtClean="0"/>
-              <a:t>10/01/2021</a:t>
+              <a:t>11/01/2021</a:t>
             </a:fld>
             <a:endParaRPr lang="en-IL" dirty="0"/>
           </a:p>
@@ -2088,13 +1827,7 @@
       </p:sp>
       <p:sp>
         <p:nvSpPr>
-          <p:cNvPr id="3" name="מציין מיקום של כותרת תחתונה 2">
-            <a:extLst>
-              <a:ext uri="{FF2B5EF4-FFF2-40B4-BE49-F238E27FC236}">
-                <a16:creationId xmlns:a16="http://schemas.microsoft.com/office/drawing/2014/main" id="{DB71E004-AD23-4793-B659-25CE01D1B1A8}"/>
-              </a:ext>
-            </a:extLst>
-          </p:cNvPr>
+          <p:cNvPr id="3" name="Footer Placeholder 2"/>
           <p:cNvSpPr>
             <a:spLocks noGrp="1"/>
           </p:cNvSpPr>
@@ -2113,13 +1846,7 @@
       </p:sp>
       <p:sp>
         <p:nvSpPr>
-          <p:cNvPr id="4" name="מציין מיקום של מספר שקופית 3">
-            <a:extLst>
-              <a:ext uri="{FF2B5EF4-FFF2-40B4-BE49-F238E27FC236}">
-                <a16:creationId xmlns:a16="http://schemas.microsoft.com/office/drawing/2014/main" id="{DA8A485F-906F-4693-B15D-5E86FD9E8B4D}"/>
-              </a:ext>
-            </a:extLst>
-          </p:cNvPr>
+          <p:cNvPr id="4" name="Slide Number Placeholder 3"/>
           <p:cNvSpPr>
             <a:spLocks noGrp="1"/>
           </p:cNvSpPr>
@@ -2143,7 +1870,7 @@
     </p:spTree>
     <p:extLst>
       <p:ext uri="{BB962C8B-B14F-4D97-AF65-F5344CB8AC3E}">
-        <p14:creationId xmlns:p14="http://schemas.microsoft.com/office/powerpoint/2010/main" val="4090007987"/>
+        <p14:creationId xmlns:p14="http://schemas.microsoft.com/office/powerpoint/2010/main" val="3544111726"/>
       </p:ext>
     </p:extLst>
   </p:cSld>
@@ -2172,13 +1899,7 @@
       </p:grpSpPr>
       <p:sp>
         <p:nvSpPr>
-          <p:cNvPr id="2" name="כותרת 1">
-            <a:extLst>
-              <a:ext uri="{FF2B5EF4-FFF2-40B4-BE49-F238E27FC236}">
-                <a16:creationId xmlns:a16="http://schemas.microsoft.com/office/drawing/2014/main" id="{09D56440-E8E9-4AD3-8A9A-423ED88A329C}"/>
-              </a:ext>
-            </a:extLst>
-          </p:cNvPr>
+          <p:cNvPr id="2" name="Title 1"/>
           <p:cNvSpPr>
             <a:spLocks noGrp="1"/>
           </p:cNvSpPr>
@@ -2188,15 +1909,15 @@
         </p:nvSpPr>
         <p:spPr>
           <a:xfrm>
-            <a:off x="839788" y="457200"/>
-            <a:ext cx="3932237" cy="1600200"/>
+            <a:off x="1859781" y="1200044"/>
+            <a:ext cx="8708267" cy="4200155"/>
           </a:xfrm>
         </p:spPr>
         <p:txBody>
           <a:bodyPr anchor="b"/>
           <a:lstStyle>
             <a:lvl1pPr>
-              <a:defRPr sz="3200"/>
+              <a:defRPr sz="8399"/>
             </a:lvl1pPr>
           </a:lstStyle>
           <a:p>
@@ -2204,19 +1925,13 @@
               <a:rPr lang="he-IL"/>
               <a:t>לחץ כדי לערוך סגנון כותרת של תבנית בסיס</a:t>
             </a:r>
-            <a:endParaRPr lang="en-IL"/>
-          </a:p>
-        </p:txBody>
-      </p:sp>
-      <p:sp>
-        <p:nvSpPr>
-          <p:cNvPr id="3" name="מציין מיקום תוכן 2">
-            <a:extLst>
-              <a:ext uri="{FF2B5EF4-FFF2-40B4-BE49-F238E27FC236}">
-                <a16:creationId xmlns:a16="http://schemas.microsoft.com/office/drawing/2014/main" id="{33C066A5-504E-4EFA-8B6C-ECE9AF3B11A4}"/>
-              </a:ext>
-            </a:extLst>
-          </p:cNvPr>
+            <a:endParaRPr lang="en-US" dirty="0"/>
+          </a:p>
+        </p:txBody>
+      </p:sp>
+      <p:sp>
+        <p:nvSpPr>
+          <p:cNvPr id="3" name="Content Placeholder 2"/>
           <p:cNvSpPr>
             <a:spLocks noGrp="1"/>
           </p:cNvSpPr>
@@ -2226,39 +1941,39 @@
         </p:nvSpPr>
         <p:spPr>
           <a:xfrm>
-            <a:off x="5183188" y="987425"/>
-            <a:ext cx="6172200" cy="4873625"/>
+            <a:off x="11478602" y="2591766"/>
+            <a:ext cx="13668851" cy="12792138"/>
           </a:xfrm>
         </p:spPr>
         <p:txBody>
           <a:bodyPr/>
           <a:lstStyle>
             <a:lvl1pPr>
-              <a:defRPr sz="3200"/>
+              <a:defRPr sz="8399"/>
             </a:lvl1pPr>
             <a:lvl2pPr>
-              <a:defRPr sz="2800"/>
+              <a:defRPr sz="7349"/>
             </a:lvl2pPr>
             <a:lvl3pPr>
-              <a:defRPr sz="2400"/>
+              <a:defRPr sz="6300"/>
             </a:lvl3pPr>
             <a:lvl4pPr>
-              <a:defRPr sz="2000"/>
+              <a:defRPr sz="5250"/>
             </a:lvl4pPr>
             <a:lvl5pPr>
-              <a:defRPr sz="2000"/>
+              <a:defRPr sz="5250"/>
             </a:lvl5pPr>
             <a:lvl6pPr>
-              <a:defRPr sz="2000"/>
+              <a:defRPr sz="5250"/>
             </a:lvl6pPr>
             <a:lvl7pPr>
-              <a:defRPr sz="2000"/>
+              <a:defRPr sz="5250"/>
             </a:lvl7pPr>
             <a:lvl8pPr>
-              <a:defRPr sz="2000"/>
+              <a:defRPr sz="5250"/>
             </a:lvl8pPr>
             <a:lvl9pPr>
-              <a:defRPr sz="2000"/>
+              <a:defRPr sz="5250"/>
             </a:lvl9pPr>
           </a:lstStyle>
           <a:p>
@@ -2295,19 +2010,13 @@
               <a:rPr lang="he-IL"/>
               <a:t>רמה חמישית</a:t>
             </a:r>
-            <a:endParaRPr lang="en-IL"/>
-          </a:p>
-        </p:txBody>
-      </p:sp>
-      <p:sp>
-        <p:nvSpPr>
-          <p:cNvPr id="4" name="מציין מיקום טקסט 3">
-            <a:extLst>
-              <a:ext uri="{FF2B5EF4-FFF2-40B4-BE49-F238E27FC236}">
-                <a16:creationId xmlns:a16="http://schemas.microsoft.com/office/drawing/2014/main" id="{1728A9BA-AE93-4B2E-9FBD-B770D8D7175C}"/>
-              </a:ext>
-            </a:extLst>
-          </p:cNvPr>
+            <a:endParaRPr lang="en-US" dirty="0"/>
+          </a:p>
+        </p:txBody>
+      </p:sp>
+      <p:sp>
+        <p:nvSpPr>
+          <p:cNvPr id="4" name="Text Placeholder 3"/>
           <p:cNvSpPr>
             <a:spLocks noGrp="1"/>
           </p:cNvSpPr>
@@ -2317,8 +2026,8 @@
         </p:nvSpPr>
         <p:spPr>
           <a:xfrm>
-            <a:off x="839788" y="2057400"/>
-            <a:ext cx="3932237" cy="3811588"/>
+            <a:off x="1859781" y="5400199"/>
+            <a:ext cx="8708267" cy="10004536"/>
           </a:xfrm>
         </p:spPr>
         <p:txBody>
@@ -2326,39 +2035,39 @@
           <a:lstStyle>
             <a:lvl1pPr marL="0" indent="0">
               <a:buNone/>
-              <a:defRPr sz="1600"/>
+              <a:defRPr sz="4200"/>
             </a:lvl1pPr>
-            <a:lvl2pPr marL="457200" indent="0">
-              <a:buNone/>
-              <a:defRPr sz="1400"/>
+            <a:lvl2pPr marL="1200059" indent="0">
+              <a:buNone/>
+              <a:defRPr sz="3675"/>
             </a:lvl2pPr>
-            <a:lvl3pPr marL="914400" indent="0">
-              <a:buNone/>
-              <a:defRPr sz="1200"/>
+            <a:lvl3pPr marL="2400117" indent="0">
+              <a:buNone/>
+              <a:defRPr sz="3150"/>
             </a:lvl3pPr>
-            <a:lvl4pPr marL="1371600" indent="0">
-              <a:buNone/>
-              <a:defRPr sz="1000"/>
+            <a:lvl4pPr marL="3600176" indent="0">
+              <a:buNone/>
+              <a:defRPr sz="2625"/>
             </a:lvl4pPr>
-            <a:lvl5pPr marL="1828800" indent="0">
-              <a:buNone/>
-              <a:defRPr sz="1000"/>
+            <a:lvl5pPr marL="4800234" indent="0">
+              <a:buNone/>
+              <a:defRPr sz="2625"/>
             </a:lvl5pPr>
-            <a:lvl6pPr marL="2286000" indent="0">
-              <a:buNone/>
-              <a:defRPr sz="1000"/>
+            <a:lvl6pPr marL="6000293" indent="0">
+              <a:buNone/>
+              <a:defRPr sz="2625"/>
             </a:lvl6pPr>
-            <a:lvl7pPr marL="2743200" indent="0">
-              <a:buNone/>
-              <a:defRPr sz="1000"/>
+            <a:lvl7pPr marL="7200351" indent="0">
+              <a:buNone/>
+              <a:defRPr sz="2625"/>
             </a:lvl7pPr>
-            <a:lvl8pPr marL="3200400" indent="0">
-              <a:buNone/>
-              <a:defRPr sz="1000"/>
+            <a:lvl8pPr marL="8400410" indent="0">
+              <a:buNone/>
+              <a:defRPr sz="2625"/>
             </a:lvl8pPr>
-            <a:lvl9pPr marL="3657600" indent="0">
-              <a:buNone/>
-              <a:defRPr sz="1000"/>
+            <a:lvl9pPr marL="9600468" indent="0">
+              <a:buNone/>
+              <a:defRPr sz="2625"/>
             </a:lvl9pPr>
           </a:lstStyle>
           <a:p>
@@ -2372,13 +2081,7 @@
       </p:sp>
       <p:sp>
         <p:nvSpPr>
-          <p:cNvPr id="5" name="מציין מיקום של תאריך 4">
-            <a:extLst>
-              <a:ext uri="{FF2B5EF4-FFF2-40B4-BE49-F238E27FC236}">
-                <a16:creationId xmlns:a16="http://schemas.microsoft.com/office/drawing/2014/main" id="{98AB145C-EB5F-40D4-836A-90079092AEF6}"/>
-              </a:ext>
-            </a:extLst>
-          </p:cNvPr>
+          <p:cNvPr id="5" name="Date Placeholder 4"/>
           <p:cNvSpPr>
             <a:spLocks noGrp="1"/>
           </p:cNvSpPr>
@@ -2393,7 +2096,7 @@
           <a:p>
             <a:fld id="{45FE9400-3064-4603-AB37-72E582AC0DEA}" type="datetimeFigureOut">
               <a:rPr lang="en-IL" smtClean="0"/>
-              <a:t>10/01/2021</a:t>
+              <a:t>11/01/2021</a:t>
             </a:fld>
             <a:endParaRPr lang="en-IL" dirty="0"/>
           </a:p>
@@ -2401,13 +2104,7 @@
       </p:sp>
       <p:sp>
         <p:nvSpPr>
-          <p:cNvPr id="6" name="מציין מיקום של כותרת תחתונה 5">
-            <a:extLst>
-              <a:ext uri="{FF2B5EF4-FFF2-40B4-BE49-F238E27FC236}">
-                <a16:creationId xmlns:a16="http://schemas.microsoft.com/office/drawing/2014/main" id="{79BCC697-F22F-4A5C-9413-E0B5B945696A}"/>
-              </a:ext>
-            </a:extLst>
-          </p:cNvPr>
+          <p:cNvPr id="6" name="Footer Placeholder 5"/>
           <p:cNvSpPr>
             <a:spLocks noGrp="1"/>
           </p:cNvSpPr>
@@ -2426,13 +2123,7 @@
       </p:sp>
       <p:sp>
         <p:nvSpPr>
-          <p:cNvPr id="7" name="מציין מיקום של מספר שקופית 6">
-            <a:extLst>
-              <a:ext uri="{FF2B5EF4-FFF2-40B4-BE49-F238E27FC236}">
-                <a16:creationId xmlns:a16="http://schemas.microsoft.com/office/drawing/2014/main" id="{B1AFCFF5-F705-4D89-AA5E-EDC2009F8456}"/>
-              </a:ext>
-            </a:extLst>
-          </p:cNvPr>
+          <p:cNvPr id="7" name="Slide Number Placeholder 6"/>
           <p:cNvSpPr>
             <a:spLocks noGrp="1"/>
           </p:cNvSpPr>
@@ -2456,7 +2147,7 @@
     </p:spTree>
     <p:extLst>
       <p:ext uri="{BB962C8B-B14F-4D97-AF65-F5344CB8AC3E}">
-        <p14:creationId xmlns:p14="http://schemas.microsoft.com/office/powerpoint/2010/main" val="3453547637"/>
+        <p14:creationId xmlns:p14="http://schemas.microsoft.com/office/powerpoint/2010/main" val="1441249962"/>
       </p:ext>
     </p:extLst>
   </p:cSld>
@@ -2485,13 +2176,7 @@
       </p:grpSpPr>
       <p:sp>
         <p:nvSpPr>
-          <p:cNvPr id="2" name="כותרת 1">
-            <a:extLst>
-              <a:ext uri="{FF2B5EF4-FFF2-40B4-BE49-F238E27FC236}">
-                <a16:creationId xmlns:a16="http://schemas.microsoft.com/office/drawing/2014/main" id="{030FC357-102D-4007-BC7E-CF0E21039E81}"/>
-              </a:ext>
-            </a:extLst>
-          </p:cNvPr>
+          <p:cNvPr id="2" name="Title 1"/>
           <p:cNvSpPr>
             <a:spLocks noGrp="1"/>
           </p:cNvSpPr>
@@ -2501,15 +2186,15 @@
         </p:nvSpPr>
         <p:spPr>
           <a:xfrm>
-            <a:off x="839788" y="457200"/>
-            <a:ext cx="3932237" cy="1600200"/>
+            <a:off x="1859781" y="1200044"/>
+            <a:ext cx="8708267" cy="4200155"/>
           </a:xfrm>
         </p:spPr>
         <p:txBody>
           <a:bodyPr anchor="b"/>
           <a:lstStyle>
             <a:lvl1pPr>
-              <a:defRPr sz="3200"/>
+              <a:defRPr sz="8399"/>
             </a:lvl1pPr>
           </a:lstStyle>
           <a:p>
@@ -2517,21 +2202,15 @@
               <a:rPr lang="he-IL"/>
               <a:t>לחץ כדי לערוך סגנון כותרת של תבנית בסיס</a:t>
             </a:r>
-            <a:endParaRPr lang="en-IL"/>
-          </a:p>
-        </p:txBody>
-      </p:sp>
-      <p:sp>
-        <p:nvSpPr>
-          <p:cNvPr id="3" name="מציין מיקום של תמונה 2">
-            <a:extLst>
-              <a:ext uri="{FF2B5EF4-FFF2-40B4-BE49-F238E27FC236}">
-                <a16:creationId xmlns:a16="http://schemas.microsoft.com/office/drawing/2014/main" id="{333C0145-7150-48DD-839F-193276607BEF}"/>
-              </a:ext>
-            </a:extLst>
-          </p:cNvPr>
-          <p:cNvSpPr>
-            <a:spLocks noGrp="1"/>
+            <a:endParaRPr lang="en-US" dirty="0"/>
+          </a:p>
+        </p:txBody>
+      </p:sp>
+      <p:sp>
+        <p:nvSpPr>
+          <p:cNvPr id="3" name="Picture Placeholder 2"/>
+          <p:cNvSpPr>
+            <a:spLocks noGrp="1" noChangeAspect="1"/>
           </p:cNvSpPr>
           <p:nvPr>
             <p:ph type="pic" idx="1"/>
@@ -2539,64 +2218,62 @@
         </p:nvSpPr>
         <p:spPr>
           <a:xfrm>
-            <a:off x="5183188" y="987425"/>
-            <a:ext cx="6172200" cy="4873625"/>
+            <a:off x="11478602" y="2591766"/>
+            <a:ext cx="13668851" cy="12792138"/>
           </a:xfrm>
         </p:spPr>
         <p:txBody>
-          <a:bodyPr/>
+          <a:bodyPr anchor="t"/>
           <a:lstStyle>
             <a:lvl1pPr marL="0" indent="0">
               <a:buNone/>
-              <a:defRPr sz="3200"/>
+              <a:defRPr sz="8399"/>
             </a:lvl1pPr>
-            <a:lvl2pPr marL="457200" indent="0">
-              <a:buNone/>
-              <a:defRPr sz="2800"/>
+            <a:lvl2pPr marL="1200059" indent="0">
+              <a:buNone/>
+              <a:defRPr sz="7349"/>
             </a:lvl2pPr>
-            <a:lvl3pPr marL="914400" indent="0">
-              <a:buNone/>
-              <a:defRPr sz="2400"/>
+            <a:lvl3pPr marL="2400117" indent="0">
+              <a:buNone/>
+              <a:defRPr sz="6300"/>
             </a:lvl3pPr>
-            <a:lvl4pPr marL="1371600" indent="0">
-              <a:buNone/>
-              <a:defRPr sz="2000"/>
+            <a:lvl4pPr marL="3600176" indent="0">
+              <a:buNone/>
+              <a:defRPr sz="5250"/>
             </a:lvl4pPr>
-            <a:lvl5pPr marL="1828800" indent="0">
-              <a:buNone/>
-              <a:defRPr sz="2000"/>
+            <a:lvl5pPr marL="4800234" indent="0">
+              <a:buNone/>
+              <a:defRPr sz="5250"/>
             </a:lvl5pPr>
-            <a:lvl6pPr marL="2286000" indent="0">
-              <a:buNone/>
-              <a:defRPr sz="2000"/>
+            <a:lvl6pPr marL="6000293" indent="0">
+              <a:buNone/>
+              <a:defRPr sz="5250"/>
             </a:lvl6pPr>
-            <a:lvl7pPr marL="2743200" indent="0">
-              <a:buNone/>
-              <a:defRPr sz="2000"/>
+            <a:lvl7pPr marL="7200351" indent="0">
+              <a:buNone/>
+              <a:defRPr sz="5250"/>
             </a:lvl7pPr>
-            <a:lvl8pPr marL="3200400" indent="0">
-              <a:buNone/>
-              <a:defRPr sz="2000"/>
+            <a:lvl8pPr marL="8400410" indent="0">
+              <a:buNone/>
+              <a:defRPr sz="5250"/>
             </a:lvl8pPr>
-            <a:lvl9pPr marL="3657600" indent="0">
-              <a:buNone/>
-              <a:defRPr sz="2000"/>
+            <a:lvl9pPr marL="9600468" indent="0">
+              <a:buNone/>
+              <a:defRPr sz="5250"/>
             </a:lvl9pPr>
           </a:lstStyle>
           <a:p>
-            <a:endParaRPr lang="en-IL" dirty="0"/>
-          </a:p>
-        </p:txBody>
-      </p:sp>
-      <p:sp>
-        <p:nvSpPr>
-          <p:cNvPr id="4" name="מציין מיקום טקסט 3">
-            <a:extLst>
-              <a:ext uri="{FF2B5EF4-FFF2-40B4-BE49-F238E27FC236}">
-                <a16:creationId xmlns:a16="http://schemas.microsoft.com/office/drawing/2014/main" id="{064EC14B-4795-4CF2-A4D7-5C63948AB3E0}"/>
-              </a:ext>
-            </a:extLst>
-          </p:cNvPr>
+            <a:r>
+              <a:rPr lang="he-IL"/>
+              <a:t>לחץ על הסמל כדי להוסיף תמונה</a:t>
+            </a:r>
+            <a:endParaRPr lang="en-US" dirty="0"/>
+          </a:p>
+        </p:txBody>
+      </p:sp>
+      <p:sp>
+        <p:nvSpPr>
+          <p:cNvPr id="4" name="Text Placeholder 3"/>
           <p:cNvSpPr>
             <a:spLocks noGrp="1"/>
           </p:cNvSpPr>
@@ -2606,8 +2283,8 @@
         </p:nvSpPr>
         <p:spPr>
           <a:xfrm>
-            <a:off x="839788" y="2057400"/>
-            <a:ext cx="3932237" cy="3811588"/>
+            <a:off x="1859781" y="5400199"/>
+            <a:ext cx="8708267" cy="10004536"/>
           </a:xfrm>
         </p:spPr>
         <p:txBody>
@@ -2615,39 +2292,39 @@
           <a:lstStyle>
             <a:lvl1pPr marL="0" indent="0">
               <a:buNone/>
-              <a:defRPr sz="1600"/>
+              <a:defRPr sz="4200"/>
             </a:lvl1pPr>
-            <a:lvl2pPr marL="457200" indent="0">
-              <a:buNone/>
-              <a:defRPr sz="1400"/>
+            <a:lvl2pPr marL="1200059" indent="0">
+              <a:buNone/>
+              <a:defRPr sz="3675"/>
             </a:lvl2pPr>
-            <a:lvl3pPr marL="914400" indent="0">
-              <a:buNone/>
-              <a:defRPr sz="1200"/>
+            <a:lvl3pPr marL="2400117" indent="0">
+              <a:buNone/>
+              <a:defRPr sz="3150"/>
             </a:lvl3pPr>
-            <a:lvl4pPr marL="1371600" indent="0">
-              <a:buNone/>
-              <a:defRPr sz="1000"/>
+            <a:lvl4pPr marL="3600176" indent="0">
+              <a:buNone/>
+              <a:defRPr sz="2625"/>
             </a:lvl4pPr>
-            <a:lvl5pPr marL="1828800" indent="0">
-              <a:buNone/>
-              <a:defRPr sz="1000"/>
+            <a:lvl5pPr marL="4800234" indent="0">
+              <a:buNone/>
+              <a:defRPr sz="2625"/>
             </a:lvl5pPr>
-            <a:lvl6pPr marL="2286000" indent="0">
-              <a:buNone/>
-              <a:defRPr sz="1000"/>
+            <a:lvl6pPr marL="6000293" indent="0">
+              <a:buNone/>
+              <a:defRPr sz="2625"/>
             </a:lvl6pPr>
-            <a:lvl7pPr marL="2743200" indent="0">
-              <a:buNone/>
-              <a:defRPr sz="1000"/>
+            <a:lvl7pPr marL="7200351" indent="0">
+              <a:buNone/>
+              <a:defRPr sz="2625"/>
             </a:lvl7pPr>
-            <a:lvl8pPr marL="3200400" indent="0">
-              <a:buNone/>
-              <a:defRPr sz="1000"/>
+            <a:lvl8pPr marL="8400410" indent="0">
+              <a:buNone/>
+              <a:defRPr sz="2625"/>
             </a:lvl8pPr>
-            <a:lvl9pPr marL="3657600" indent="0">
-              <a:buNone/>
-              <a:defRPr sz="1000"/>
+            <a:lvl9pPr marL="9600468" indent="0">
+              <a:buNone/>
+              <a:defRPr sz="2625"/>
             </a:lvl9pPr>
           </a:lstStyle>
           <a:p>
@@ -2661,13 +2338,7 @@
       </p:sp>
       <p:sp>
         <p:nvSpPr>
-          <p:cNvPr id="5" name="מציין מיקום של תאריך 4">
-            <a:extLst>
-              <a:ext uri="{FF2B5EF4-FFF2-40B4-BE49-F238E27FC236}">
-                <a16:creationId xmlns:a16="http://schemas.microsoft.com/office/drawing/2014/main" id="{5A1A1C31-9229-4017-B222-EB08B0D71F9F}"/>
-              </a:ext>
-            </a:extLst>
-          </p:cNvPr>
+          <p:cNvPr id="5" name="Date Placeholder 4"/>
           <p:cNvSpPr>
             <a:spLocks noGrp="1"/>
           </p:cNvSpPr>
@@ -2682,7 +2353,7 @@
           <a:p>
             <a:fld id="{45FE9400-3064-4603-AB37-72E582AC0DEA}" type="datetimeFigureOut">
               <a:rPr lang="en-IL" smtClean="0"/>
-              <a:t>10/01/2021</a:t>
+              <a:t>11/01/2021</a:t>
             </a:fld>
             <a:endParaRPr lang="en-IL" dirty="0"/>
           </a:p>
@@ -2690,13 +2361,7 @@
       </p:sp>
       <p:sp>
         <p:nvSpPr>
-          <p:cNvPr id="6" name="מציין מיקום של כותרת תחתונה 5">
-            <a:extLst>
-              <a:ext uri="{FF2B5EF4-FFF2-40B4-BE49-F238E27FC236}">
-                <a16:creationId xmlns:a16="http://schemas.microsoft.com/office/drawing/2014/main" id="{3C27391C-C047-49E7-AC1F-5506F377C638}"/>
-              </a:ext>
-            </a:extLst>
-          </p:cNvPr>
+          <p:cNvPr id="6" name="Footer Placeholder 5"/>
           <p:cNvSpPr>
             <a:spLocks noGrp="1"/>
           </p:cNvSpPr>
@@ -2715,13 +2380,7 @@
       </p:sp>
       <p:sp>
         <p:nvSpPr>
-          <p:cNvPr id="7" name="מציין מיקום של מספר שקופית 6">
-            <a:extLst>
-              <a:ext uri="{FF2B5EF4-FFF2-40B4-BE49-F238E27FC236}">
-                <a16:creationId xmlns:a16="http://schemas.microsoft.com/office/drawing/2014/main" id="{22224782-ED8F-4D12-BB2B-810CFB07B9D8}"/>
-              </a:ext>
-            </a:extLst>
-          </p:cNvPr>
+          <p:cNvPr id="7" name="Slide Number Placeholder 6"/>
           <p:cNvSpPr>
             <a:spLocks noGrp="1"/>
           </p:cNvSpPr>
@@ -2745,7 +2404,7 @@
     </p:spTree>
     <p:extLst>
       <p:ext uri="{BB962C8B-B14F-4D97-AF65-F5344CB8AC3E}">
-        <p14:creationId xmlns:p14="http://schemas.microsoft.com/office/powerpoint/2010/main" val="1295768957"/>
+        <p14:creationId xmlns:p14="http://schemas.microsoft.com/office/powerpoint/2010/main" val="124386175"/>
       </p:ext>
     </p:extLst>
   </p:cSld>
@@ -2779,13 +2438,7 @@
       </p:grpSpPr>
       <p:sp>
         <p:nvSpPr>
-          <p:cNvPr id="2" name="מציין מיקום של כותרת 1">
-            <a:extLst>
-              <a:ext uri="{FF2B5EF4-FFF2-40B4-BE49-F238E27FC236}">
-                <a16:creationId xmlns:a16="http://schemas.microsoft.com/office/drawing/2014/main" id="{060A8EF8-75E2-40CF-A764-4DC5A641AE23}"/>
-              </a:ext>
-            </a:extLst>
-          </p:cNvPr>
+          <p:cNvPr id="2" name="Title Placeholder 1"/>
           <p:cNvSpPr>
             <a:spLocks noGrp="1"/>
           </p:cNvSpPr>
@@ -2795,15 +2448,15 @@
         </p:nvSpPr>
         <p:spPr>
           <a:xfrm>
-            <a:off x="838200" y="365125"/>
-            <a:ext cx="10515600" cy="1325563"/>
+            <a:off x="1856264" y="958373"/>
+            <a:ext cx="23287673" cy="3479296"/>
           </a:xfrm>
           <a:prstGeom prst="rect">
             <a:avLst/>
           </a:prstGeom>
         </p:spPr>
         <p:txBody>
-          <a:bodyPr vert="horz" lIns="91440" tIns="45720" rIns="91440" bIns="45720" rtlCol="1" anchor="ctr">
+          <a:bodyPr vert="horz" lIns="91440" tIns="45720" rIns="91440" bIns="45720" rtlCol="0" anchor="ctr">
             <a:normAutofit/>
           </a:bodyPr>
           <a:lstStyle/>
@@ -2812,19 +2465,13 @@
               <a:rPr lang="he-IL"/>
               <a:t>לחץ כדי לערוך סגנון כותרת של תבנית בסיס</a:t>
             </a:r>
-            <a:endParaRPr lang="en-IL"/>
-          </a:p>
-        </p:txBody>
-      </p:sp>
-      <p:sp>
-        <p:nvSpPr>
-          <p:cNvPr id="3" name="מציין מיקום טקסט 2">
-            <a:extLst>
-              <a:ext uri="{FF2B5EF4-FFF2-40B4-BE49-F238E27FC236}">
-                <a16:creationId xmlns:a16="http://schemas.microsoft.com/office/drawing/2014/main" id="{C2CBAC99-5C7B-4DE1-A23A-418739859F14}"/>
-              </a:ext>
-            </a:extLst>
-          </p:cNvPr>
+            <a:endParaRPr lang="en-US" dirty="0"/>
+          </a:p>
+        </p:txBody>
+      </p:sp>
+      <p:sp>
+        <p:nvSpPr>
+          <p:cNvPr id="3" name="Text Placeholder 2"/>
           <p:cNvSpPr>
             <a:spLocks noGrp="1"/>
           </p:cNvSpPr>
@@ -2834,15 +2481,15 @@
         </p:nvSpPr>
         <p:spPr>
           <a:xfrm>
-            <a:off x="838200" y="1825625"/>
-            <a:ext cx="10515600" cy="4351338"/>
+            <a:off x="1856264" y="4791843"/>
+            <a:ext cx="23287673" cy="11421255"/>
           </a:xfrm>
           <a:prstGeom prst="rect">
             <a:avLst/>
           </a:prstGeom>
         </p:spPr>
         <p:txBody>
-          <a:bodyPr vert="horz" lIns="91440" tIns="45720" rIns="91440" bIns="45720" rtlCol="1">
+          <a:bodyPr vert="horz" lIns="91440" tIns="45720" rIns="91440" bIns="45720" rtlCol="0">
             <a:normAutofit/>
           </a:bodyPr>
           <a:lstStyle/>
@@ -2880,19 +2527,13 @@
               <a:rPr lang="he-IL"/>
               <a:t>רמה חמישית</a:t>
             </a:r>
-            <a:endParaRPr lang="en-IL"/>
-          </a:p>
-        </p:txBody>
-      </p:sp>
-      <p:sp>
-        <p:nvSpPr>
-          <p:cNvPr id="4" name="מציין מיקום של תאריך 3">
-            <a:extLst>
-              <a:ext uri="{FF2B5EF4-FFF2-40B4-BE49-F238E27FC236}">
-                <a16:creationId xmlns:a16="http://schemas.microsoft.com/office/drawing/2014/main" id="{9172216C-5C54-4484-9635-DD1B483C13F9}"/>
-              </a:ext>
-            </a:extLst>
-          </p:cNvPr>
+            <a:endParaRPr lang="en-US" dirty="0"/>
+          </a:p>
+        </p:txBody>
+      </p:sp>
+      <p:sp>
+        <p:nvSpPr>
+          <p:cNvPr id="4" name="Date Placeholder 3"/>
           <p:cNvSpPr>
             <a:spLocks noGrp="1"/>
           </p:cNvSpPr>
@@ -2902,18 +2543,18 @@
         </p:nvSpPr>
         <p:spPr>
           <a:xfrm>
-            <a:off x="8610600" y="6356350"/>
-            <a:ext cx="2743200" cy="365125"/>
+            <a:off x="1856264" y="16683952"/>
+            <a:ext cx="6075045" cy="958369"/>
           </a:xfrm>
           <a:prstGeom prst="rect">
             <a:avLst/>
           </a:prstGeom>
         </p:spPr>
         <p:txBody>
-          <a:bodyPr vert="horz" lIns="91440" tIns="45720" rIns="91440" bIns="45720" rtlCol="1" anchor="ctr"/>
+          <a:bodyPr vert="horz" lIns="91440" tIns="45720" rIns="91440" bIns="45720" rtlCol="0" anchor="ctr"/>
           <a:lstStyle>
             <a:lvl1pPr algn="l">
-              <a:defRPr sz="1200">
+              <a:defRPr sz="3150">
                 <a:solidFill>
                   <a:schemeClr val="tx1">
                     <a:tint val="75000"/>
@@ -2925,7 +2566,7 @@
           <a:p>
             <a:fld id="{45FE9400-3064-4603-AB37-72E582AC0DEA}" type="datetimeFigureOut">
               <a:rPr lang="en-IL" smtClean="0"/>
-              <a:t>10/01/2021</a:t>
+              <a:t>11/01/2021</a:t>
             </a:fld>
             <a:endParaRPr lang="en-IL" dirty="0"/>
           </a:p>
@@ -2933,13 +2574,7 @@
       </p:sp>
       <p:sp>
         <p:nvSpPr>
-          <p:cNvPr id="5" name="מציין מיקום של כותרת תחתונה 4">
-            <a:extLst>
-              <a:ext uri="{FF2B5EF4-FFF2-40B4-BE49-F238E27FC236}">
-                <a16:creationId xmlns:a16="http://schemas.microsoft.com/office/drawing/2014/main" id="{E1AE8A50-6EAD-47D2-A696-2B0A4CF437F6}"/>
-              </a:ext>
-            </a:extLst>
-          </p:cNvPr>
+          <p:cNvPr id="5" name="Footer Placeholder 4"/>
           <p:cNvSpPr>
             <a:spLocks noGrp="1"/>
           </p:cNvSpPr>
@@ -2949,18 +2584,18 @@
         </p:nvSpPr>
         <p:spPr>
           <a:xfrm>
-            <a:off x="4038600" y="6356350"/>
-            <a:ext cx="4114800" cy="365125"/>
+            <a:off x="8943816" y="16683952"/>
+            <a:ext cx="9112568" cy="958369"/>
           </a:xfrm>
           <a:prstGeom prst="rect">
             <a:avLst/>
           </a:prstGeom>
         </p:spPr>
         <p:txBody>
-          <a:bodyPr vert="horz" lIns="91440" tIns="45720" rIns="91440" bIns="45720" rtlCol="1" anchor="ctr"/>
+          <a:bodyPr vert="horz" lIns="91440" tIns="45720" rIns="91440" bIns="45720" rtlCol="0" anchor="ctr"/>
           <a:lstStyle>
             <a:lvl1pPr algn="ctr">
-              <a:defRPr sz="1200">
+              <a:defRPr sz="3150">
                 <a:solidFill>
                   <a:schemeClr val="tx1">
                     <a:tint val="75000"/>
@@ -2976,13 +2611,7 @@
       </p:sp>
       <p:sp>
         <p:nvSpPr>
-          <p:cNvPr id="6" name="מציין מיקום של מספר שקופית 5">
-            <a:extLst>
-              <a:ext uri="{FF2B5EF4-FFF2-40B4-BE49-F238E27FC236}">
-                <a16:creationId xmlns:a16="http://schemas.microsoft.com/office/drawing/2014/main" id="{6FB7AA34-6D1A-4A2D-86C9-4B89F5C1062A}"/>
-              </a:ext>
-            </a:extLst>
-          </p:cNvPr>
+          <p:cNvPr id="6" name="Slide Number Placeholder 5"/>
           <p:cNvSpPr>
             <a:spLocks noGrp="1"/>
           </p:cNvSpPr>
@@ -2992,18 +2621,18 @@
         </p:nvSpPr>
         <p:spPr>
           <a:xfrm>
-            <a:off x="838200" y="6356350"/>
-            <a:ext cx="2743200" cy="365125"/>
+            <a:off x="19068891" y="16683952"/>
+            <a:ext cx="6075045" cy="958369"/>
           </a:xfrm>
           <a:prstGeom prst="rect">
             <a:avLst/>
           </a:prstGeom>
         </p:spPr>
         <p:txBody>
-          <a:bodyPr vert="horz" lIns="91440" tIns="45720" rIns="91440" bIns="45720" rtlCol="1" anchor="ctr"/>
+          <a:bodyPr vert="horz" lIns="91440" tIns="45720" rIns="91440" bIns="45720" rtlCol="0" anchor="ctr"/>
           <a:lstStyle>
             <a:lvl1pPr algn="r">
-              <a:defRPr sz="1200">
+              <a:defRPr sz="3150">
                 <a:solidFill>
                   <a:schemeClr val="tx1">
                     <a:tint val="75000"/>
@@ -3024,27 +2653,27 @@
     </p:spTree>
     <p:extLst>
       <p:ext uri="{BB962C8B-B14F-4D97-AF65-F5344CB8AC3E}">
-        <p14:creationId xmlns:p14="http://schemas.microsoft.com/office/powerpoint/2010/main" val="412726628"/>
+        <p14:creationId xmlns:p14="http://schemas.microsoft.com/office/powerpoint/2010/main" val="1790313253"/>
       </p:ext>
     </p:extLst>
   </p:cSld>
   <p:clrMap bg1="lt1" tx1="dk1" bg2="lt2" tx2="dk2" accent1="accent1" accent2="accent2" accent3="accent3" accent4="accent4" accent5="accent5" accent6="accent6" hlink="hlink" folHlink="folHlink"/>
   <p:sldLayoutIdLst>
-    <p:sldLayoutId id="2147483649" r:id="rId1"/>
-    <p:sldLayoutId id="2147483650" r:id="rId2"/>
-    <p:sldLayoutId id="2147483651" r:id="rId3"/>
-    <p:sldLayoutId id="2147483652" r:id="rId4"/>
-    <p:sldLayoutId id="2147483653" r:id="rId5"/>
-    <p:sldLayoutId id="2147483654" r:id="rId6"/>
-    <p:sldLayoutId id="2147483655" r:id="rId7"/>
-    <p:sldLayoutId id="2147483656" r:id="rId8"/>
-    <p:sldLayoutId id="2147483657" r:id="rId9"/>
-    <p:sldLayoutId id="2147483658" r:id="rId10"/>
-    <p:sldLayoutId id="2147483659" r:id="rId11"/>
+    <p:sldLayoutId id="2147483661" r:id="rId1"/>
+    <p:sldLayoutId id="2147483662" r:id="rId2"/>
+    <p:sldLayoutId id="2147483663" r:id="rId3"/>
+    <p:sldLayoutId id="2147483664" r:id="rId4"/>
+    <p:sldLayoutId id="2147483665" r:id="rId5"/>
+    <p:sldLayoutId id="2147483666" r:id="rId6"/>
+    <p:sldLayoutId id="2147483667" r:id="rId7"/>
+    <p:sldLayoutId id="2147483668" r:id="rId8"/>
+    <p:sldLayoutId id="2147483669" r:id="rId9"/>
+    <p:sldLayoutId id="2147483670" r:id="rId10"/>
+    <p:sldLayoutId id="2147483671" r:id="rId11"/>
   </p:sldLayoutIdLst>
   <p:txStyles>
     <p:titleStyle>
-      <a:lvl1pPr algn="r" defTabSz="914400" rtl="1" eaLnBrk="1" latinLnBrk="0" hangingPunct="1">
+      <a:lvl1pPr algn="l" defTabSz="2400117" rtl="0" eaLnBrk="1" latinLnBrk="0" hangingPunct="1">
         <a:lnSpc>
           <a:spcPct val="90000"/>
         </a:lnSpc>
@@ -3052,7 +2681,7 @@
           <a:spcPct val="0"/>
         </a:spcBef>
         <a:buNone/>
-        <a:defRPr sz="4400" kern="1200">
+        <a:defRPr sz="11549" kern="1200">
           <a:solidFill>
             <a:schemeClr val="tx1"/>
           </a:solidFill>
@@ -3063,16 +2692,16 @@
       </a:lvl1pPr>
     </p:titleStyle>
     <p:bodyStyle>
-      <a:lvl1pPr marL="228600" indent="-228600" algn="r" defTabSz="914400" rtl="1" eaLnBrk="1" latinLnBrk="0" hangingPunct="1">
+      <a:lvl1pPr marL="600029" indent="-600029" algn="l" defTabSz="2400117" rtl="0" eaLnBrk="1" latinLnBrk="0" hangingPunct="1">
         <a:lnSpc>
           <a:spcPct val="90000"/>
         </a:lnSpc>
         <a:spcBef>
-          <a:spcPts val="1000"/>
+          <a:spcPts val="2625"/>
         </a:spcBef>
         <a:buFont typeface="Arial" panose="020B0604020202020204" pitchFamily="34" charset="0"/>
         <a:buChar char="•"/>
-        <a:defRPr sz="2800" kern="1200">
+        <a:defRPr sz="7349" kern="1200">
           <a:solidFill>
             <a:schemeClr val="tx1"/>
           </a:solidFill>
@@ -3081,16 +2710,16 @@
           <a:cs typeface="+mn-cs"/>
         </a:defRPr>
       </a:lvl1pPr>
-      <a:lvl2pPr marL="685800" indent="-228600" algn="r" defTabSz="914400" rtl="1" eaLnBrk="1" latinLnBrk="0" hangingPunct="1">
+      <a:lvl2pPr marL="1800088" indent="-600029" algn="l" defTabSz="2400117" rtl="0" eaLnBrk="1" latinLnBrk="0" hangingPunct="1">
         <a:lnSpc>
           <a:spcPct val="90000"/>
         </a:lnSpc>
         <a:spcBef>
-          <a:spcPts val="500"/>
+          <a:spcPts val="1312"/>
         </a:spcBef>
         <a:buFont typeface="Arial" panose="020B0604020202020204" pitchFamily="34" charset="0"/>
         <a:buChar char="•"/>
-        <a:defRPr sz="2400" kern="1200">
+        <a:defRPr sz="6300" kern="1200">
           <a:solidFill>
             <a:schemeClr val="tx1"/>
           </a:solidFill>
@@ -3099,16 +2728,16 @@
           <a:cs typeface="+mn-cs"/>
         </a:defRPr>
       </a:lvl2pPr>
-      <a:lvl3pPr marL="1143000" indent="-228600" algn="r" defTabSz="914400" rtl="1" eaLnBrk="1" latinLnBrk="0" hangingPunct="1">
+      <a:lvl3pPr marL="3000146" indent="-600029" algn="l" defTabSz="2400117" rtl="0" eaLnBrk="1" latinLnBrk="0" hangingPunct="1">
         <a:lnSpc>
           <a:spcPct val="90000"/>
         </a:lnSpc>
         <a:spcBef>
-          <a:spcPts val="500"/>
+          <a:spcPts val="1312"/>
         </a:spcBef>
         <a:buFont typeface="Arial" panose="020B0604020202020204" pitchFamily="34" charset="0"/>
         <a:buChar char="•"/>
-        <a:defRPr sz="2000" kern="1200">
+        <a:defRPr sz="5250" kern="1200">
           <a:solidFill>
             <a:schemeClr val="tx1"/>
           </a:solidFill>
@@ -3117,16 +2746,16 @@
           <a:cs typeface="+mn-cs"/>
         </a:defRPr>
       </a:lvl3pPr>
-      <a:lvl4pPr marL="1600200" indent="-228600" algn="r" defTabSz="914400" rtl="1" eaLnBrk="1" latinLnBrk="0" hangingPunct="1">
+      <a:lvl4pPr marL="4200205" indent="-600029" algn="l" defTabSz="2400117" rtl="0" eaLnBrk="1" latinLnBrk="0" hangingPunct="1">
         <a:lnSpc>
           <a:spcPct val="90000"/>
         </a:lnSpc>
         <a:spcBef>
-          <a:spcPts val="500"/>
+          <a:spcPts val="1312"/>
         </a:spcBef>
         <a:buFont typeface="Arial" panose="020B0604020202020204" pitchFamily="34" charset="0"/>
         <a:buChar char="•"/>
-        <a:defRPr sz="1800" kern="1200">
+        <a:defRPr sz="4725" kern="1200">
           <a:solidFill>
             <a:schemeClr val="tx1"/>
           </a:solidFill>
@@ -3135,16 +2764,16 @@
           <a:cs typeface="+mn-cs"/>
         </a:defRPr>
       </a:lvl4pPr>
-      <a:lvl5pPr marL="2057400" indent="-228600" algn="r" defTabSz="914400" rtl="1" eaLnBrk="1" latinLnBrk="0" hangingPunct="1">
+      <a:lvl5pPr marL="5400264" indent="-600029" algn="l" defTabSz="2400117" rtl="0" eaLnBrk="1" latinLnBrk="0" hangingPunct="1">
         <a:lnSpc>
           <a:spcPct val="90000"/>
         </a:lnSpc>
         <a:spcBef>
-          <a:spcPts val="500"/>
+          <a:spcPts val="1312"/>
         </a:spcBef>
         <a:buFont typeface="Arial" panose="020B0604020202020204" pitchFamily="34" charset="0"/>
         <a:buChar char="•"/>
-        <a:defRPr sz="1800" kern="1200">
+        <a:defRPr sz="4725" kern="1200">
           <a:solidFill>
             <a:schemeClr val="tx1"/>
           </a:solidFill>
@@ -3153,16 +2782,16 @@
           <a:cs typeface="+mn-cs"/>
         </a:defRPr>
       </a:lvl5pPr>
-      <a:lvl6pPr marL="2514600" indent="-228600" algn="r" defTabSz="914400" rtl="1" eaLnBrk="1" latinLnBrk="0" hangingPunct="1">
+      <a:lvl6pPr marL="6600322" indent="-600029" algn="l" defTabSz="2400117" rtl="0" eaLnBrk="1" latinLnBrk="0" hangingPunct="1">
         <a:lnSpc>
           <a:spcPct val="90000"/>
         </a:lnSpc>
         <a:spcBef>
-          <a:spcPts val="500"/>
+          <a:spcPts val="1312"/>
         </a:spcBef>
         <a:buFont typeface="Arial" panose="020B0604020202020204" pitchFamily="34" charset="0"/>
         <a:buChar char="•"/>
-        <a:defRPr sz="1800" kern="1200">
+        <a:defRPr sz="4725" kern="1200">
           <a:solidFill>
             <a:schemeClr val="tx1"/>
           </a:solidFill>
@@ -3171,16 +2800,16 @@
           <a:cs typeface="+mn-cs"/>
         </a:defRPr>
       </a:lvl6pPr>
-      <a:lvl7pPr marL="2971800" indent="-228600" algn="r" defTabSz="914400" rtl="1" eaLnBrk="1" latinLnBrk="0" hangingPunct="1">
+      <a:lvl7pPr marL="7800381" indent="-600029" algn="l" defTabSz="2400117" rtl="0" eaLnBrk="1" latinLnBrk="0" hangingPunct="1">
         <a:lnSpc>
           <a:spcPct val="90000"/>
         </a:lnSpc>
         <a:spcBef>
-          <a:spcPts val="500"/>
+          <a:spcPts val="1312"/>
         </a:spcBef>
         <a:buFont typeface="Arial" panose="020B0604020202020204" pitchFamily="34" charset="0"/>
         <a:buChar char="•"/>
-        <a:defRPr sz="1800" kern="1200">
+        <a:defRPr sz="4725" kern="1200">
           <a:solidFill>
             <a:schemeClr val="tx1"/>
           </a:solidFill>
@@ -3189,16 +2818,16 @@
           <a:cs typeface="+mn-cs"/>
         </a:defRPr>
       </a:lvl7pPr>
-      <a:lvl8pPr marL="3429000" indent="-228600" algn="r" defTabSz="914400" rtl="1" eaLnBrk="1" latinLnBrk="0" hangingPunct="1">
+      <a:lvl8pPr marL="9000439" indent="-600029" algn="l" defTabSz="2400117" rtl="0" eaLnBrk="1" latinLnBrk="0" hangingPunct="1">
         <a:lnSpc>
           <a:spcPct val="90000"/>
         </a:lnSpc>
         <a:spcBef>
-          <a:spcPts val="500"/>
+          <a:spcPts val="1312"/>
         </a:spcBef>
         <a:buFont typeface="Arial" panose="020B0604020202020204" pitchFamily="34" charset="0"/>
         <a:buChar char="•"/>
-        <a:defRPr sz="1800" kern="1200">
+        <a:defRPr sz="4725" kern="1200">
           <a:solidFill>
             <a:schemeClr val="tx1"/>
           </a:solidFill>
@@ -3207,16 +2836,16 @@
           <a:cs typeface="+mn-cs"/>
         </a:defRPr>
       </a:lvl8pPr>
-      <a:lvl9pPr marL="3886200" indent="-228600" algn="r" defTabSz="914400" rtl="1" eaLnBrk="1" latinLnBrk="0" hangingPunct="1">
+      <a:lvl9pPr marL="10200498" indent="-600029" algn="l" defTabSz="2400117" rtl="0" eaLnBrk="1" latinLnBrk="0" hangingPunct="1">
         <a:lnSpc>
           <a:spcPct val="90000"/>
         </a:lnSpc>
         <a:spcBef>
-          <a:spcPts val="500"/>
+          <a:spcPts val="1312"/>
         </a:spcBef>
         <a:buFont typeface="Arial" panose="020B0604020202020204" pitchFamily="34" charset="0"/>
         <a:buChar char="•"/>
-        <a:defRPr sz="1800" kern="1200">
+        <a:defRPr sz="4725" kern="1200">
           <a:solidFill>
             <a:schemeClr val="tx1"/>
           </a:solidFill>
@@ -3228,10 +2857,10 @@
     </p:bodyStyle>
     <p:otherStyle>
       <a:defPPr>
-        <a:defRPr lang="en-IL"/>
+        <a:defRPr lang="en-US"/>
       </a:defPPr>
-      <a:lvl1pPr marL="0" algn="r" defTabSz="914400" rtl="1" eaLnBrk="1" latinLnBrk="0" hangingPunct="1">
-        <a:defRPr sz="1800" kern="1200">
+      <a:lvl1pPr marL="0" algn="l" defTabSz="2400117" rtl="0" eaLnBrk="1" latinLnBrk="0" hangingPunct="1">
+        <a:defRPr sz="4725" kern="1200">
           <a:solidFill>
             <a:schemeClr val="tx1"/>
           </a:solidFill>
@@ -3240,8 +2869,8 @@
           <a:cs typeface="+mn-cs"/>
         </a:defRPr>
       </a:lvl1pPr>
-      <a:lvl2pPr marL="457200" algn="r" defTabSz="914400" rtl="1" eaLnBrk="1" latinLnBrk="0" hangingPunct="1">
-        <a:defRPr sz="1800" kern="1200">
+      <a:lvl2pPr marL="1200059" algn="l" defTabSz="2400117" rtl="0" eaLnBrk="1" latinLnBrk="0" hangingPunct="1">
+        <a:defRPr sz="4725" kern="1200">
           <a:solidFill>
             <a:schemeClr val="tx1"/>
           </a:solidFill>
@@ -3250,8 +2879,8 @@
           <a:cs typeface="+mn-cs"/>
         </a:defRPr>
       </a:lvl2pPr>
-      <a:lvl3pPr marL="914400" algn="r" defTabSz="914400" rtl="1" eaLnBrk="1" latinLnBrk="0" hangingPunct="1">
-        <a:defRPr sz="1800" kern="1200">
+      <a:lvl3pPr marL="2400117" algn="l" defTabSz="2400117" rtl="0" eaLnBrk="1" latinLnBrk="0" hangingPunct="1">
+        <a:defRPr sz="4725" kern="1200">
           <a:solidFill>
             <a:schemeClr val="tx1"/>
           </a:solidFill>
@@ -3260,8 +2889,8 @@
           <a:cs typeface="+mn-cs"/>
         </a:defRPr>
       </a:lvl3pPr>
-      <a:lvl4pPr marL="1371600" algn="r" defTabSz="914400" rtl="1" eaLnBrk="1" latinLnBrk="0" hangingPunct="1">
-        <a:defRPr sz="1800" kern="1200">
+      <a:lvl4pPr marL="3600176" algn="l" defTabSz="2400117" rtl="0" eaLnBrk="1" latinLnBrk="0" hangingPunct="1">
+        <a:defRPr sz="4725" kern="1200">
           <a:solidFill>
             <a:schemeClr val="tx1"/>
           </a:solidFill>
@@ -3270,8 +2899,8 @@
           <a:cs typeface="+mn-cs"/>
         </a:defRPr>
       </a:lvl4pPr>
-      <a:lvl5pPr marL="1828800" algn="r" defTabSz="914400" rtl="1" eaLnBrk="1" latinLnBrk="0" hangingPunct="1">
-        <a:defRPr sz="1800" kern="1200">
+      <a:lvl5pPr marL="4800234" algn="l" defTabSz="2400117" rtl="0" eaLnBrk="1" latinLnBrk="0" hangingPunct="1">
+        <a:defRPr sz="4725" kern="1200">
           <a:solidFill>
             <a:schemeClr val="tx1"/>
           </a:solidFill>
@@ -3280,8 +2909,8 @@
           <a:cs typeface="+mn-cs"/>
         </a:defRPr>
       </a:lvl5pPr>
-      <a:lvl6pPr marL="2286000" algn="r" defTabSz="914400" rtl="1" eaLnBrk="1" latinLnBrk="0" hangingPunct="1">
-        <a:defRPr sz="1800" kern="1200">
+      <a:lvl6pPr marL="6000293" algn="l" defTabSz="2400117" rtl="0" eaLnBrk="1" latinLnBrk="0" hangingPunct="1">
+        <a:defRPr sz="4725" kern="1200">
           <a:solidFill>
             <a:schemeClr val="tx1"/>
           </a:solidFill>
@@ -3290,8 +2919,8 @@
           <a:cs typeface="+mn-cs"/>
         </a:defRPr>
       </a:lvl6pPr>
-      <a:lvl7pPr marL="2743200" algn="r" defTabSz="914400" rtl="1" eaLnBrk="1" latinLnBrk="0" hangingPunct="1">
-        <a:defRPr sz="1800" kern="1200">
+      <a:lvl7pPr marL="7200351" algn="l" defTabSz="2400117" rtl="0" eaLnBrk="1" latinLnBrk="0" hangingPunct="1">
+        <a:defRPr sz="4725" kern="1200">
           <a:solidFill>
             <a:schemeClr val="tx1"/>
           </a:solidFill>
@@ -3300,8 +2929,8 @@
           <a:cs typeface="+mn-cs"/>
         </a:defRPr>
       </a:lvl7pPr>
-      <a:lvl8pPr marL="3200400" algn="r" defTabSz="914400" rtl="1" eaLnBrk="1" latinLnBrk="0" hangingPunct="1">
-        <a:defRPr sz="1800" kern="1200">
+      <a:lvl8pPr marL="8400410" algn="l" defTabSz="2400117" rtl="0" eaLnBrk="1" latinLnBrk="0" hangingPunct="1">
+        <a:defRPr sz="4725" kern="1200">
           <a:solidFill>
             <a:schemeClr val="tx1"/>
           </a:solidFill>
@@ -3310,8 +2939,8 @@
           <a:cs typeface="+mn-cs"/>
         </a:defRPr>
       </a:lvl8pPr>
-      <a:lvl9pPr marL="3657600" algn="r" defTabSz="914400" rtl="1" eaLnBrk="1" latinLnBrk="0" hangingPunct="1">
-        <a:defRPr sz="1800" kern="1200">
+      <a:lvl9pPr marL="9600468" algn="l" defTabSz="2400117" rtl="0" eaLnBrk="1" latinLnBrk="0" hangingPunct="1">
+        <a:defRPr sz="4725" kern="1200">
           <a:solidFill>
             <a:schemeClr val="tx1"/>
           </a:solidFill>
@@ -3342,225 +2971,282 @@
           <a:chExt cx="0" cy="0"/>
         </a:xfrm>
       </p:grpSpPr>
-      <p:sp>
-        <p:nvSpPr>
-          <p:cNvPr id="5" name="תיבת טקסט 4">
+      <p:grpSp>
+        <p:nvGrpSpPr>
+          <p:cNvPr id="2" name="קבוצה 1">
             <a:extLst>
               <a:ext uri="{FF2B5EF4-FFF2-40B4-BE49-F238E27FC236}">
-                <a16:creationId xmlns:a16="http://schemas.microsoft.com/office/drawing/2014/main" id="{2577A047-573E-408A-8148-7F7E63D35ECE}"/>
+                <a16:creationId xmlns:a16="http://schemas.microsoft.com/office/drawing/2014/main" id="{572C5B54-1920-4104-90C2-7DB529367FB2}"/>
               </a:ext>
             </a:extLst>
           </p:cNvPr>
-          <p:cNvSpPr txBox="1"/>
+          <p:cNvGrpSpPr/>
           <p:nvPr/>
-        </p:nvSpPr>
+        </p:nvGrpSpPr>
+        <p:grpSpPr>
+          <a:xfrm>
+            <a:off x="346810" y="367503"/>
+            <a:ext cx="26423815" cy="16913966"/>
+            <a:chOff x="7775141" y="5745710"/>
+            <a:chExt cx="11500945" cy="7066756"/>
+          </a:xfrm>
+        </p:grpSpPr>
+        <p:sp>
+          <p:nvSpPr>
+            <p:cNvPr id="5" name="תיבת טקסט 4">
+              <a:extLst>
+                <a:ext uri="{FF2B5EF4-FFF2-40B4-BE49-F238E27FC236}">
+                  <a16:creationId xmlns:a16="http://schemas.microsoft.com/office/drawing/2014/main" id="{2577A047-573E-408A-8148-7F7E63D35ECE}"/>
+                </a:ext>
+              </a:extLst>
+            </p:cNvPr>
+            <p:cNvSpPr txBox="1"/>
+            <p:nvPr/>
+          </p:nvSpPr>
+          <p:spPr>
+            <a:xfrm>
+              <a:off x="7775141" y="5745710"/>
+              <a:ext cx="11500945" cy="1426850"/>
+            </a:xfrm>
+            <a:prstGeom prst="rect">
+              <a:avLst/>
+            </a:prstGeom>
+            <a:noFill/>
+          </p:spPr>
+          <p:txBody>
+            <a:bodyPr wrap="square">
+              <a:spAutoFit/>
+            </a:bodyPr>
+            <a:lstStyle/>
+            <a:p>
+              <a:pPr algn="l" rtl="0">
+                <a:lnSpc>
+                  <a:spcPct val="150000"/>
+                </a:lnSpc>
+              </a:pPr>
+              <a:r>
+                <a:rPr lang="en-IL" sz="4000" b="1" dirty="0">
+                  <a:latin typeface="Avenir Next LT Pro" panose="020B0504020202020204" pitchFamily="34" charset="0"/>
+                </a:rPr>
+                <a:t>Instructions:</a:t>
+              </a:r>
+              <a:endParaRPr lang="en-US" sz="4000" b="1" dirty="0">
+                <a:latin typeface="Avenir Next LT Pro" panose="020B0504020202020204" pitchFamily="34" charset="0"/>
+              </a:endParaRPr>
+            </a:p>
+            <a:p>
+              <a:pPr algn="l" rtl="0">
+                <a:lnSpc>
+                  <a:spcPct val="150000"/>
+                </a:lnSpc>
+              </a:pPr>
+              <a:r>
+                <a:rPr lang="en-US" sz="3600" dirty="0">
+                  <a:latin typeface="Avenir Next LT Pro" panose="020B0504020202020204" pitchFamily="34" charset="0"/>
+                </a:rPr>
+                <a:t>Y</a:t>
+              </a:r>
+              <a:r>
+                <a:rPr lang="en-IL" sz="3600" dirty="0">
+                  <a:latin typeface="Avenir Next LT Pro" panose="020B0504020202020204" pitchFamily="34" charset="0"/>
+                </a:rPr>
+                <a:t>our goal, </a:t>
+              </a:r>
+              <a:r>
+                <a:rPr lang="en-US" sz="3600" dirty="0">
+                  <a:latin typeface="Avenir Next LT Pro" panose="020B0504020202020204" pitchFamily="34" charset="0"/>
+                </a:rPr>
+                <a:t>should</a:t>
+              </a:r>
+              <a:r>
+                <a:rPr lang="en-IL" sz="3600" dirty="0">
+                  <a:latin typeface="Avenir Next LT Pro" panose="020B0504020202020204" pitchFamily="34" charset="0"/>
+                </a:rPr>
+                <a:t> you choose to accept it, is to gain as many points as possible.  To gain points, you must create words from the randomly assorted letters in the cube grid. The longer the word, the higher the point value of the word.</a:t>
+              </a:r>
+              <a:endParaRPr lang="en-US" sz="3600" dirty="0">
+                <a:latin typeface="Avenir Next LT Pro" panose="020B0504020202020204" pitchFamily="34" charset="0"/>
+              </a:endParaRPr>
+            </a:p>
+            <a:p>
+              <a:pPr algn="l" rtl="0">
+                <a:lnSpc>
+                  <a:spcPct val="150000"/>
+                </a:lnSpc>
+              </a:pPr>
+              <a:endParaRPr lang="en-US" sz="3600" dirty="0">
+                <a:latin typeface="Avenir Next LT Pro" panose="020B0504020202020204" pitchFamily="34" charset="0"/>
+              </a:endParaRPr>
+            </a:p>
+          </p:txBody>
+        </p:sp>
+        <p:sp>
+          <p:nvSpPr>
+            <p:cNvPr id="7" name="תיבת טקסט 6">
+              <a:extLst>
+                <a:ext uri="{FF2B5EF4-FFF2-40B4-BE49-F238E27FC236}">
+                  <a16:creationId xmlns:a16="http://schemas.microsoft.com/office/drawing/2014/main" id="{B3064D78-B879-4A61-A7C9-896066788436}"/>
+                </a:ext>
+              </a:extLst>
+            </p:cNvPr>
+            <p:cNvSpPr txBox="1"/>
+            <p:nvPr/>
+          </p:nvSpPr>
+          <p:spPr>
+            <a:xfrm>
+              <a:off x="7775141" y="6872076"/>
+              <a:ext cx="5724959" cy="5940390"/>
+            </a:xfrm>
+            <a:prstGeom prst="rect">
+              <a:avLst/>
+            </a:prstGeom>
+            <a:noFill/>
+          </p:spPr>
+          <p:txBody>
+            <a:bodyPr wrap="square">
+              <a:spAutoFit/>
+            </a:bodyPr>
+            <a:lstStyle/>
+            <a:p>
+              <a:pPr algn="just" rtl="0">
+                <a:lnSpc>
+                  <a:spcPct val="150000"/>
+                </a:lnSpc>
+              </a:pPr>
+              <a:r>
+                <a:rPr lang="en-IL" sz="4000" b="1" dirty="0">
+                  <a:latin typeface="Avenir Next LT Pro" panose="020B0504020202020204" pitchFamily="34" charset="0"/>
+                </a:rPr>
+                <a:t>Gameplay</a:t>
+              </a:r>
+              <a:r>
+                <a:rPr lang="en-IL" sz="3600" b="1" dirty="0">
+                  <a:latin typeface="Avenir Next LT Pro" panose="020B0504020202020204" pitchFamily="34" charset="0"/>
+                </a:rPr>
+                <a:t>:</a:t>
+              </a:r>
+              <a:endParaRPr lang="en-US" sz="3600" b="1" dirty="0">
+                <a:latin typeface="Avenir Next LT Pro" panose="020B0504020202020204" pitchFamily="34" charset="0"/>
+              </a:endParaRPr>
+            </a:p>
+            <a:p>
+              <a:pPr algn="just" rtl="0">
+                <a:lnSpc>
+                  <a:spcPct val="150000"/>
+                </a:lnSpc>
+              </a:pPr>
+              <a:r>
+                <a:rPr lang="en-US" sz="3600" dirty="0">
+                  <a:latin typeface="Avenir Next LT Pro" panose="020B0504020202020204" pitchFamily="34" charset="0"/>
+                </a:rPr>
+                <a:t>W</a:t>
+              </a:r>
+              <a:r>
+                <a:rPr lang="en-IL" sz="3600" dirty="0">
+                  <a:latin typeface="Avenir Next LT Pro" panose="020B0504020202020204" pitchFamily="34" charset="0"/>
+                </a:rPr>
+                <a:t>hen the game starts, a randomly generated board will be hidden until you press "Start", </a:t>
+              </a:r>
+              <a:r>
+                <a:rPr lang="en-US" sz="3600" dirty="0">
+                  <a:latin typeface="Avenir Next LT Pro" panose="020B0504020202020204" pitchFamily="34" charset="0"/>
+                </a:rPr>
+                <a:t>then </a:t>
+              </a:r>
+              <a:r>
+                <a:rPr lang="en-IL" sz="3600" dirty="0">
+                  <a:latin typeface="Avenir Next LT Pro" panose="020B0504020202020204" pitchFamily="34" charset="0"/>
+                </a:rPr>
+                <a:t>the grid of cubes will be revealed and the game will start the timer at the same time.</a:t>
+              </a:r>
+              <a:endParaRPr lang="en-US" sz="3600" dirty="0">
+                <a:latin typeface="Avenir Next LT Pro" panose="020B0504020202020204" pitchFamily="34" charset="0"/>
+              </a:endParaRPr>
+            </a:p>
+            <a:p>
+              <a:pPr algn="just" rtl="0">
+                <a:lnSpc>
+                  <a:spcPct val="150000"/>
+                </a:lnSpc>
+              </a:pPr>
+              <a:r>
+                <a:rPr lang="en-IL" sz="3600" dirty="0">
+                  <a:latin typeface="Avenir Next LT Pro" panose="020B0504020202020204" pitchFamily="34" charset="0"/>
+                </a:rPr>
+                <a:t>Words should be created by using adjoining letters – the letters must touch each other – and must be able to connect in the proper sequence to spell the word correctly. The letters may join in any direction – horizontally, vertically, or diagonally. Words can be spelled in any direction, including backwards. You may not use a letter cube multiple times in a single word.  </a:t>
+              </a:r>
+              <a:endParaRPr lang="en-US" sz="3600" dirty="0">
+                <a:latin typeface="Avenir Next LT Pro" panose="020B0504020202020204" pitchFamily="34" charset="0"/>
+              </a:endParaRPr>
+            </a:p>
+            <a:p>
+              <a:pPr algn="just" rtl="0">
+                <a:lnSpc>
+                  <a:spcPct val="150000"/>
+                </a:lnSpc>
+              </a:pPr>
+              <a:r>
+                <a:rPr lang="en-IL" sz="3600" dirty="0">
+                  <a:latin typeface="Avenir Next LT Pro" panose="020B0504020202020204" pitchFamily="34" charset="0"/>
+                </a:rPr>
+                <a:t>To select a word, simply click on the cube of the first letter and start dragging the mouse over the cubes in the correct order, and after you have reached the final cube release the mouse button.</a:t>
+              </a:r>
+              <a:endParaRPr lang="en-US" sz="3600" dirty="0">
+                <a:latin typeface="Avenir Next LT Pro" panose="020B0504020202020204" pitchFamily="34" charset="0"/>
+              </a:endParaRPr>
+            </a:p>
+            <a:p>
+              <a:pPr algn="just" rtl="0">
+                <a:lnSpc>
+                  <a:spcPct val="150000"/>
+                </a:lnSpc>
+              </a:pPr>
+              <a:r>
+                <a:rPr lang="en-IL" sz="3600" dirty="0">
+                  <a:latin typeface="Avenir Next LT Pro" panose="020B0504020202020204" pitchFamily="34" charset="0"/>
+                </a:rPr>
+                <a:t>When the timer runs out, the game will show an end game screen with your score and the words you found (and some might have missed if there are any).</a:t>
+              </a:r>
+            </a:p>
+          </p:txBody>
+        </p:sp>
+      </p:grpSp>
+      <p:pic>
+        <p:nvPicPr>
+          <p:cNvPr id="6" name="תמונה 5">
+            <a:extLst>
+              <a:ext uri="{FF2B5EF4-FFF2-40B4-BE49-F238E27FC236}">
+                <a16:creationId xmlns:a16="http://schemas.microsoft.com/office/drawing/2014/main" id="{B9CD11D1-D809-433E-8E49-01B726FF625C}"/>
+              </a:ext>
+            </a:extLst>
+          </p:cNvPr>
+          <p:cNvPicPr>
+            <a:picLocks noChangeAspect="1"/>
+          </p:cNvPicPr>
+          <p:nvPr/>
+        </p:nvPicPr>
+        <p:blipFill>
+          <a:blip r:embed="rId2">
+            <a:extLst>
+              <a:ext uri="{28A0092B-C50C-407E-A947-70E740481C1C}">
+                <a14:useLocalDpi xmlns:a14="http://schemas.microsoft.com/office/drawing/2010/main" val="0"/>
+              </a:ext>
+            </a:extLst>
+          </a:blip>
+          <a:stretch>
+            <a:fillRect/>
+          </a:stretch>
+        </p:blipFill>
         <p:spPr>
           <a:xfrm>
-            <a:off x="220092" y="20834"/>
-            <a:ext cx="11751816" cy="1574277"/>
+            <a:off x="14054094" y="5611488"/>
+            <a:ext cx="12162535" cy="9121901"/>
           </a:xfrm>
           <a:prstGeom prst="rect">
             <a:avLst/>
           </a:prstGeom>
-          <a:noFill/>
         </p:spPr>
-        <p:txBody>
-          <a:bodyPr wrap="square">
-            <a:spAutoFit/>
-          </a:bodyPr>
-          <a:lstStyle/>
-          <a:p>
-            <a:pPr algn="l" rtl="0">
-              <a:lnSpc>
-                <a:spcPct val="150000"/>
-              </a:lnSpc>
-            </a:pPr>
-            <a:r>
-              <a:rPr lang="en-IL" b="1" dirty="0">
-                <a:latin typeface="Avenir Next LT Pro" panose="020B0504020202020204" pitchFamily="34" charset="0"/>
-              </a:rPr>
-              <a:t>Instructions:</a:t>
-            </a:r>
-            <a:endParaRPr lang="en-US" b="1" dirty="0">
-              <a:latin typeface="Avenir Next LT Pro" panose="020B0504020202020204" pitchFamily="34" charset="0"/>
-            </a:endParaRPr>
-          </a:p>
-          <a:p>
-            <a:pPr algn="l" rtl="0">
-              <a:lnSpc>
-                <a:spcPct val="150000"/>
-              </a:lnSpc>
-            </a:pPr>
-            <a:r>
-              <a:rPr lang="en-US" sz="1600" dirty="0">
-                <a:latin typeface="Avenir Next LT Pro" panose="020B0504020202020204" pitchFamily="34" charset="0"/>
-              </a:rPr>
-              <a:t>Y</a:t>
-            </a:r>
-            <a:r>
-              <a:rPr lang="en-IL" sz="1600" dirty="0">
-                <a:latin typeface="Avenir Next LT Pro" panose="020B0504020202020204" pitchFamily="34" charset="0"/>
-              </a:rPr>
-              <a:t>our goal, </a:t>
-            </a:r>
-            <a:r>
-              <a:rPr lang="en-US" sz="1600" dirty="0">
-                <a:latin typeface="Avenir Next LT Pro" panose="020B0504020202020204" pitchFamily="34" charset="0"/>
-              </a:rPr>
-              <a:t>should</a:t>
-            </a:r>
-            <a:r>
-              <a:rPr lang="en-IL" sz="1600" dirty="0">
-                <a:latin typeface="Avenir Next LT Pro" panose="020B0504020202020204" pitchFamily="34" charset="0"/>
-              </a:rPr>
-              <a:t> you choose to accept it, is to gain as many points as possible.  To gain points, you must create words from the randomly assorted letters in the cube grid. The longer the word, the higher the point value of the word.</a:t>
-            </a:r>
-            <a:endParaRPr lang="en-US" sz="1600" dirty="0">
-              <a:latin typeface="Avenir Next LT Pro" panose="020B0504020202020204" pitchFamily="34" charset="0"/>
-            </a:endParaRPr>
-          </a:p>
-          <a:p>
-            <a:pPr algn="l" rtl="0">
-              <a:lnSpc>
-                <a:spcPct val="150000"/>
-              </a:lnSpc>
-            </a:pPr>
-            <a:endParaRPr lang="en-US" sz="1600" dirty="0">
-              <a:latin typeface="Avenir Next LT Pro" panose="020B0504020202020204" pitchFamily="34" charset="0"/>
-            </a:endParaRPr>
-          </a:p>
-        </p:txBody>
-      </p:sp>
-      <p:sp>
-        <p:nvSpPr>
-          <p:cNvPr id="7" name="תיבת טקסט 6">
-            <a:extLst>
-              <a:ext uri="{FF2B5EF4-FFF2-40B4-BE49-F238E27FC236}">
-                <a16:creationId xmlns:a16="http://schemas.microsoft.com/office/drawing/2014/main" id="{B3064D78-B879-4A61-A7C9-896066788436}"/>
-              </a:ext>
-            </a:extLst>
-          </p:cNvPr>
-          <p:cNvSpPr txBox="1"/>
-          <p:nvPr/>
-        </p:nvSpPr>
-        <p:spPr>
-          <a:xfrm>
-            <a:off x="220093" y="1145220"/>
-            <a:ext cx="7032964" cy="5636928"/>
-          </a:xfrm>
-          <a:prstGeom prst="rect">
-            <a:avLst/>
-          </a:prstGeom>
-          <a:noFill/>
-        </p:spPr>
-        <p:txBody>
-          <a:bodyPr wrap="square">
-            <a:spAutoFit/>
-          </a:bodyPr>
-          <a:lstStyle/>
-          <a:p>
-            <a:pPr algn="just" rtl="0">
-              <a:lnSpc>
-                <a:spcPct val="150000"/>
-              </a:lnSpc>
-            </a:pPr>
-            <a:r>
-              <a:rPr lang="en-IL" b="1" dirty="0">
-                <a:latin typeface="Avenir Next LT Pro" panose="020B0504020202020204" pitchFamily="34" charset="0"/>
-              </a:rPr>
-              <a:t>Gameplay</a:t>
-            </a:r>
-            <a:r>
-              <a:rPr lang="en-IL" sz="1600" b="1" dirty="0">
-                <a:latin typeface="Avenir Next LT Pro" panose="020B0504020202020204" pitchFamily="34" charset="0"/>
-              </a:rPr>
-              <a:t>:</a:t>
-            </a:r>
-            <a:endParaRPr lang="en-US" sz="1600" b="1" dirty="0">
-              <a:latin typeface="Avenir Next LT Pro" panose="020B0504020202020204" pitchFamily="34" charset="0"/>
-            </a:endParaRPr>
-          </a:p>
-          <a:p>
-            <a:pPr algn="just" rtl="0">
-              <a:lnSpc>
-                <a:spcPct val="150000"/>
-              </a:lnSpc>
-            </a:pPr>
-            <a:r>
-              <a:rPr lang="en-US" sz="1600" dirty="0">
-                <a:latin typeface="Avenir Next LT Pro" panose="020B0504020202020204" pitchFamily="34" charset="0"/>
-              </a:rPr>
-              <a:t>W</a:t>
-            </a:r>
-            <a:r>
-              <a:rPr lang="en-IL" sz="1600" dirty="0">
-                <a:latin typeface="Avenir Next LT Pro" panose="020B0504020202020204" pitchFamily="34" charset="0"/>
-              </a:rPr>
-              <a:t>hen the game starts, a randomly generated board will be hidden until you press "Start", </a:t>
-            </a:r>
-            <a:r>
-              <a:rPr lang="en-US" sz="1600" dirty="0">
-                <a:latin typeface="Avenir Next LT Pro" panose="020B0504020202020204" pitchFamily="34" charset="0"/>
-              </a:rPr>
-              <a:t>then </a:t>
-            </a:r>
-            <a:r>
-              <a:rPr lang="en-IL" sz="1600" dirty="0">
-                <a:latin typeface="Avenir Next LT Pro" panose="020B0504020202020204" pitchFamily="34" charset="0"/>
-              </a:rPr>
-              <a:t>the grid of cubes will be revealed and the game will start the timer at the same time.</a:t>
-            </a:r>
-            <a:endParaRPr lang="en-US" sz="1600" dirty="0">
-              <a:latin typeface="Avenir Next LT Pro" panose="020B0504020202020204" pitchFamily="34" charset="0"/>
-            </a:endParaRPr>
-          </a:p>
-          <a:p>
-            <a:pPr algn="just" rtl="0">
-              <a:lnSpc>
-                <a:spcPct val="150000"/>
-              </a:lnSpc>
-            </a:pPr>
-            <a:r>
-              <a:rPr lang="en-IL" sz="1600" dirty="0">
-                <a:latin typeface="Avenir Next LT Pro" panose="020B0504020202020204" pitchFamily="34" charset="0"/>
-              </a:rPr>
-              <a:t>Words should be created by using adjoining letters – the letters must touch each other – and must be able to connect in the proper sequence to spell the word correctly. The letters may join in any direction – horizontally, vertically, or diagonally. Words can be spelled in any direction, including backwards. You may not use a letter cube multiple times in a single word.  </a:t>
-            </a:r>
-            <a:endParaRPr lang="en-US" sz="1600" dirty="0">
-              <a:latin typeface="Avenir Next LT Pro" panose="020B0504020202020204" pitchFamily="34" charset="0"/>
-            </a:endParaRPr>
-          </a:p>
-          <a:p>
-            <a:pPr algn="just" rtl="0">
-              <a:lnSpc>
-                <a:spcPct val="150000"/>
-              </a:lnSpc>
-            </a:pPr>
-            <a:r>
-              <a:rPr lang="en-IL" sz="1600" dirty="0">
-                <a:latin typeface="Avenir Next LT Pro" panose="020B0504020202020204" pitchFamily="34" charset="0"/>
-              </a:rPr>
-              <a:t>To select a word, simply click on the cube of the first letter and start dragging the mouse over the cubes in the correct order, and after you have reached the final cube release the mouse button.</a:t>
-            </a:r>
-            <a:endParaRPr lang="en-US" sz="1600" dirty="0">
-              <a:latin typeface="Avenir Next LT Pro" panose="020B0504020202020204" pitchFamily="34" charset="0"/>
-            </a:endParaRPr>
-          </a:p>
-          <a:p>
-            <a:pPr algn="just" rtl="0">
-              <a:lnSpc>
-                <a:spcPct val="150000"/>
-              </a:lnSpc>
-            </a:pPr>
-            <a:r>
-              <a:rPr lang="en-IL" sz="1600" dirty="0">
-                <a:latin typeface="Avenir Next LT Pro" panose="020B0504020202020204" pitchFamily="34" charset="0"/>
-              </a:rPr>
-              <a:t>When the timer runs out, the game will show an end game screen with your score and the words you found (and some might have missed if there are any).</a:t>
-            </a:r>
-          </a:p>
-        </p:txBody>
-      </p:sp>
+      </p:pic>
     </p:spTree>
     <p:extLst>
       <p:ext uri="{BB962C8B-B14F-4D97-AF65-F5344CB8AC3E}">
@@ -3577,7 +3263,7 @@
 <file path=ppt/theme/theme1.xml><?xml version="1.0" encoding="utf-8"?>
 <a:theme xmlns:a="http://schemas.openxmlformats.org/drawingml/2006/main" name="ערכת נושא Office">
   <a:themeElements>
-    <a:clrScheme name="Office">
+    <a:clrScheme name="ערכת נושא Office">
       <a:dk1>
         <a:sysClr val="windowText" lastClr="000000"/>
       </a:dk1>
@@ -3615,7 +3301,7 @@
         <a:srgbClr val="954F72"/>
       </a:folHlink>
     </a:clrScheme>
-    <a:fontScheme name="Office">
+    <a:fontScheme name="ערכת נושא Office">
       <a:majorFont>
         <a:latin typeface="Calibri Light" panose="020F0302020204030204"/>
         <a:ea typeface=""/>
@@ -3650,23 +3336,6 @@
         <a:font script="Viet" typeface="Times New Roman"/>
         <a:font script="Uigh" typeface="Microsoft Uighur"/>
         <a:font script="Geor" typeface="Sylfaen"/>
-        <a:font script="Armn" typeface="Arial"/>
-        <a:font script="Bugi" typeface="Leelawadee UI"/>
-        <a:font script="Bopo" typeface="Microsoft JhengHei"/>
-        <a:font script="Java" typeface="Javanese Text"/>
-        <a:font script="Lisu" typeface="Segoe UI"/>
-        <a:font script="Mymr" typeface="Myanmar Text"/>
-        <a:font script="Nkoo" typeface="Ebrima"/>
-        <a:font script="Olck" typeface="Nirmala UI"/>
-        <a:font script="Osma" typeface="Ebrima"/>
-        <a:font script="Phag" typeface="Phagspa"/>
-        <a:font script="Syrn" typeface="Estrangelo Edessa"/>
-        <a:font script="Syrj" typeface="Estrangelo Edessa"/>
-        <a:font script="Syre" typeface="Estrangelo Edessa"/>
-        <a:font script="Sora" typeface="Nirmala UI"/>
-        <a:font script="Tale" typeface="Microsoft Tai Le"/>
-        <a:font script="Talu" typeface="Microsoft New Tai Lue"/>
-        <a:font script="Tfng" typeface="Ebrima"/>
       </a:majorFont>
       <a:minorFont>
         <a:latin typeface="Calibri" panose="020F0502020204030204"/>
@@ -3702,26 +3371,9 @@
         <a:font script="Viet" typeface="Arial"/>
         <a:font script="Uigh" typeface="Microsoft Uighur"/>
         <a:font script="Geor" typeface="Sylfaen"/>
-        <a:font script="Armn" typeface="Arial"/>
-        <a:font script="Bugi" typeface="Leelawadee UI"/>
-        <a:font script="Bopo" typeface="Microsoft JhengHei"/>
-        <a:font script="Java" typeface="Javanese Text"/>
-        <a:font script="Lisu" typeface="Segoe UI"/>
-        <a:font script="Mymr" typeface="Myanmar Text"/>
-        <a:font script="Nkoo" typeface="Ebrima"/>
-        <a:font script="Olck" typeface="Nirmala UI"/>
-        <a:font script="Osma" typeface="Ebrima"/>
-        <a:font script="Phag" typeface="Phagspa"/>
-        <a:font script="Syrn" typeface="Estrangelo Edessa"/>
-        <a:font script="Syrj" typeface="Estrangelo Edessa"/>
-        <a:font script="Syre" typeface="Estrangelo Edessa"/>
-        <a:font script="Sora" typeface="Nirmala UI"/>
-        <a:font script="Tale" typeface="Microsoft Tai Le"/>
-        <a:font script="Talu" typeface="Microsoft New Tai Lue"/>
-        <a:font script="Tfng" typeface="Ebrima"/>
       </a:minorFont>
     </a:fontScheme>
-    <a:fmtScheme name="Office">
+    <a:fmtScheme name="ערכת נושא Office">
       <a:fillStyleLst>
         <a:solidFill>
           <a:schemeClr val="phClr"/>

</xml_diff>

<commit_message>
added description to all files added README for submission
</commit_message>
<xml_diff>
--- a/instructions.pptx
+++ b/instructions.pptx
@@ -6,6 +6,7 @@
   </p:sldMasterIdLst>
   <p:sldIdLst>
     <p:sldId id="256" r:id="rId2"/>
+    <p:sldId id="257" r:id="rId3"/>
   </p:sldIdLst>
   <p:sldSz cx="27000200" cy="18000663"/>
   <p:notesSz cx="6858000" cy="9144000"/>
@@ -243,7 +244,7 @@
           <a:p>
             <a:fld id="{45FE9400-3064-4603-AB37-72E582AC0DEA}" type="datetimeFigureOut">
               <a:rPr lang="en-IL" smtClean="0"/>
-              <a:t>11/01/2021</a:t>
+              <a:t>13/01/2021</a:t>
             </a:fld>
             <a:endParaRPr lang="en-IL" dirty="0"/>
           </a:p>
@@ -413,7 +414,7 @@
           <a:p>
             <a:fld id="{45FE9400-3064-4603-AB37-72E582AC0DEA}" type="datetimeFigureOut">
               <a:rPr lang="en-IL" smtClean="0"/>
-              <a:t>11/01/2021</a:t>
+              <a:t>13/01/2021</a:t>
             </a:fld>
             <a:endParaRPr lang="en-IL" dirty="0"/>
           </a:p>
@@ -593,7 +594,7 @@
           <a:p>
             <a:fld id="{45FE9400-3064-4603-AB37-72E582AC0DEA}" type="datetimeFigureOut">
               <a:rPr lang="en-IL" smtClean="0"/>
-              <a:t>11/01/2021</a:t>
+              <a:t>13/01/2021</a:t>
             </a:fld>
             <a:endParaRPr lang="en-IL" dirty="0"/>
           </a:p>
@@ -763,7 +764,7 @@
           <a:p>
             <a:fld id="{45FE9400-3064-4603-AB37-72E582AC0DEA}" type="datetimeFigureOut">
               <a:rPr lang="en-IL" smtClean="0"/>
-              <a:t>11/01/2021</a:t>
+              <a:t>13/01/2021</a:t>
             </a:fld>
             <a:endParaRPr lang="en-IL" dirty="0"/>
           </a:p>
@@ -1007,7 +1008,7 @@
           <a:p>
             <a:fld id="{45FE9400-3064-4603-AB37-72E582AC0DEA}" type="datetimeFigureOut">
               <a:rPr lang="en-IL" smtClean="0"/>
-              <a:t>11/01/2021</a:t>
+              <a:t>13/01/2021</a:t>
             </a:fld>
             <a:endParaRPr lang="en-IL" dirty="0"/>
           </a:p>
@@ -1239,7 +1240,7 @@
           <a:p>
             <a:fld id="{45FE9400-3064-4603-AB37-72E582AC0DEA}" type="datetimeFigureOut">
               <a:rPr lang="en-IL" smtClean="0"/>
-              <a:t>11/01/2021</a:t>
+              <a:t>13/01/2021</a:t>
             </a:fld>
             <a:endParaRPr lang="en-IL" dirty="0"/>
           </a:p>
@@ -1606,7 +1607,7 @@
           <a:p>
             <a:fld id="{45FE9400-3064-4603-AB37-72E582AC0DEA}" type="datetimeFigureOut">
               <a:rPr lang="en-IL" smtClean="0"/>
-              <a:t>11/01/2021</a:t>
+              <a:t>13/01/2021</a:t>
             </a:fld>
             <a:endParaRPr lang="en-IL" dirty="0"/>
           </a:p>
@@ -1724,7 +1725,7 @@
           <a:p>
             <a:fld id="{45FE9400-3064-4603-AB37-72E582AC0DEA}" type="datetimeFigureOut">
               <a:rPr lang="en-IL" smtClean="0"/>
-              <a:t>11/01/2021</a:t>
+              <a:t>13/01/2021</a:t>
             </a:fld>
             <a:endParaRPr lang="en-IL" dirty="0"/>
           </a:p>
@@ -1819,7 +1820,7 @@
           <a:p>
             <a:fld id="{45FE9400-3064-4603-AB37-72E582AC0DEA}" type="datetimeFigureOut">
               <a:rPr lang="en-IL" smtClean="0"/>
-              <a:t>11/01/2021</a:t>
+              <a:t>13/01/2021</a:t>
             </a:fld>
             <a:endParaRPr lang="en-IL" dirty="0"/>
           </a:p>
@@ -2096,7 +2097,7 @@
           <a:p>
             <a:fld id="{45FE9400-3064-4603-AB37-72E582AC0DEA}" type="datetimeFigureOut">
               <a:rPr lang="en-IL" smtClean="0"/>
-              <a:t>11/01/2021</a:t>
+              <a:t>13/01/2021</a:t>
             </a:fld>
             <a:endParaRPr lang="en-IL" dirty="0"/>
           </a:p>
@@ -2353,7 +2354,7 @@
           <a:p>
             <a:fld id="{45FE9400-3064-4603-AB37-72E582AC0DEA}" type="datetimeFigureOut">
               <a:rPr lang="en-IL" smtClean="0"/>
-              <a:t>11/01/2021</a:t>
+              <a:t>13/01/2021</a:t>
             </a:fld>
             <a:endParaRPr lang="en-IL" dirty="0"/>
           </a:p>
@@ -2566,7 +2567,7 @@
           <a:p>
             <a:fld id="{45FE9400-3064-4603-AB37-72E582AC0DEA}" type="datetimeFigureOut">
               <a:rPr lang="en-IL" smtClean="0"/>
-              <a:t>11/01/2021</a:t>
+              <a:t>13/01/2021</a:t>
             </a:fld>
             <a:endParaRPr lang="en-IL" dirty="0"/>
           </a:p>
@@ -3260,6 +3261,307 @@
 </p:sld>
 </file>
 
+<file path=ppt/slides/slide2.xml><?xml version="1.0" encoding="utf-8"?>
+<p:sld xmlns:a="http://schemas.openxmlformats.org/drawingml/2006/main" xmlns:r="http://schemas.openxmlformats.org/officeDocument/2006/relationships" xmlns:p="http://schemas.openxmlformats.org/presentationml/2006/main">
+  <p:cSld>
+    <p:spTree>
+      <p:nvGrpSpPr>
+        <p:cNvPr id="1" name=""/>
+        <p:cNvGrpSpPr/>
+        <p:nvPr/>
+      </p:nvGrpSpPr>
+      <p:grpSpPr>
+        <a:xfrm>
+          <a:off x="0" y="0"/>
+          <a:ext cx="0" cy="0"/>
+          <a:chOff x="0" y="0"/>
+          <a:chExt cx="0" cy="0"/>
+        </a:xfrm>
+      </p:grpSpPr>
+      <p:sp>
+        <p:nvSpPr>
+          <p:cNvPr id="10" name="מלבן 9">
+            <a:extLst>
+              <a:ext uri="{FF2B5EF4-FFF2-40B4-BE49-F238E27FC236}">
+                <a16:creationId xmlns:a16="http://schemas.microsoft.com/office/drawing/2014/main" id="{FC585C18-4405-42A6-9890-0A07C5C88CDB}"/>
+              </a:ext>
+            </a:extLst>
+          </p:cNvPr>
+          <p:cNvSpPr/>
+          <p:nvPr/>
+        </p:nvSpPr>
+        <p:spPr>
+          <a:xfrm>
+            <a:off x="4736122" y="2180492"/>
+            <a:ext cx="15724248" cy="13669108"/>
+          </a:xfrm>
+          <a:prstGeom prst="rect">
+            <a:avLst/>
+          </a:prstGeom>
+          <a:solidFill>
+            <a:schemeClr val="bg1"/>
+          </a:solidFill>
+          <a:ln w="28575">
+            <a:solidFill>
+              <a:schemeClr val="tx1"/>
+            </a:solidFill>
+          </a:ln>
+        </p:spPr>
+        <p:style>
+          <a:lnRef idx="2">
+            <a:schemeClr val="accent1">
+              <a:shade val="50000"/>
+            </a:schemeClr>
+          </a:lnRef>
+          <a:fillRef idx="1">
+            <a:schemeClr val="accent1"/>
+          </a:fillRef>
+          <a:effectRef idx="0">
+            <a:schemeClr val="accent1"/>
+          </a:effectRef>
+          <a:fontRef idx="minor">
+            <a:schemeClr val="lt1"/>
+          </a:fontRef>
+        </p:style>
+        <p:txBody>
+          <a:bodyPr rtlCol="0" anchor="ctr"/>
+          <a:lstStyle/>
+          <a:p>
+            <a:pPr algn="ctr"/>
+            <a:endParaRPr lang="en-IL"/>
+          </a:p>
+        </p:txBody>
+      </p:sp>
+      <p:pic>
+        <p:nvPicPr>
+          <p:cNvPr id="5" name="תמונה 4">
+            <a:extLst>
+              <a:ext uri="{FF2B5EF4-FFF2-40B4-BE49-F238E27FC236}">
+                <a16:creationId xmlns:a16="http://schemas.microsoft.com/office/drawing/2014/main" id="{FC615B4C-F8CA-4AC4-B479-440AEF019338}"/>
+              </a:ext>
+            </a:extLst>
+          </p:cNvPr>
+          <p:cNvPicPr>
+            <a:picLocks noChangeAspect="1"/>
+          </p:cNvPicPr>
+          <p:nvPr/>
+        </p:nvPicPr>
+        <p:blipFill rotWithShape="1">
+          <a:blip r:embed="rId2"/>
+          <a:srcRect l="3905" t="8903" r="8125"/>
+          <a:stretch/>
+        </p:blipFill>
+        <p:spPr>
+          <a:xfrm>
+            <a:off x="5051307" y="2438400"/>
+            <a:ext cx="15135832" cy="11755254"/>
+          </a:xfrm>
+          <a:prstGeom prst="rect">
+            <a:avLst/>
+          </a:prstGeom>
+        </p:spPr>
+      </p:pic>
+      <p:sp>
+        <p:nvSpPr>
+          <p:cNvPr id="6" name="תיבת טקסט 5">
+            <a:extLst>
+              <a:ext uri="{FF2B5EF4-FFF2-40B4-BE49-F238E27FC236}">
+                <a16:creationId xmlns:a16="http://schemas.microsoft.com/office/drawing/2014/main" id="{421BE096-8945-43D8-ACEE-D970A3B7064B}"/>
+              </a:ext>
+            </a:extLst>
+          </p:cNvPr>
+          <p:cNvSpPr txBox="1"/>
+          <p:nvPr/>
+        </p:nvSpPr>
+        <p:spPr>
+          <a:xfrm>
+            <a:off x="7291754" y="13839712"/>
+            <a:ext cx="5603632" cy="1323438"/>
+          </a:xfrm>
+          <a:prstGeom prst="rect">
+            <a:avLst/>
+          </a:prstGeom>
+          <a:noFill/>
+        </p:spPr>
+        <p:txBody>
+          <a:bodyPr wrap="square" rtlCol="0">
+            <a:spAutoFit/>
+          </a:bodyPr>
+          <a:lstStyle/>
+          <a:p>
+            <a:r>
+              <a:rPr lang="en-US" sz="4000" dirty="0">
+                <a:latin typeface="Calibri Light" panose="020F0302020204030204" pitchFamily="34" charset="0"/>
+                <a:cs typeface="Calibri Light" panose="020F0302020204030204" pitchFamily="34" charset="0"/>
+              </a:rPr>
+              <a:t>Recursive find_n_length_words</a:t>
+            </a:r>
+            <a:endParaRPr lang="en-IL" sz="4000" dirty="0">
+              <a:latin typeface="Calibri Light" panose="020F0302020204030204" pitchFamily="34" charset="0"/>
+              <a:cs typeface="Calibri Light" panose="020F0302020204030204" pitchFamily="34" charset="0"/>
+            </a:endParaRPr>
+          </a:p>
+        </p:txBody>
+      </p:sp>
+      <p:sp>
+        <p:nvSpPr>
+          <p:cNvPr id="7" name="תיבת טקסט 6">
+            <a:extLst>
+              <a:ext uri="{FF2B5EF4-FFF2-40B4-BE49-F238E27FC236}">
+                <a16:creationId xmlns:a16="http://schemas.microsoft.com/office/drawing/2014/main" id="{A1189E87-D117-4E4D-B6FE-F0F31D5C2C50}"/>
+              </a:ext>
+            </a:extLst>
+          </p:cNvPr>
+          <p:cNvSpPr txBox="1"/>
+          <p:nvPr/>
+        </p:nvSpPr>
+        <p:spPr>
+          <a:xfrm>
+            <a:off x="14516461" y="13839711"/>
+            <a:ext cx="5318985" cy="1323439"/>
+          </a:xfrm>
+          <a:prstGeom prst="rect">
+            <a:avLst/>
+          </a:prstGeom>
+          <a:noFill/>
+        </p:spPr>
+        <p:txBody>
+          <a:bodyPr wrap="square" rtlCol="0">
+            <a:spAutoFit/>
+          </a:bodyPr>
+          <a:lstStyle/>
+          <a:p>
+            <a:r>
+              <a:rPr lang="en-US" sz="4000" dirty="0">
+                <a:latin typeface="Calibri Light" panose="020F0302020204030204" pitchFamily="34" charset="0"/>
+                <a:cs typeface="Calibri Light" panose="020F0302020204030204" pitchFamily="34" charset="0"/>
+              </a:rPr>
+              <a:t>Combination based find_n_length_words</a:t>
+            </a:r>
+            <a:endParaRPr lang="en-IL" sz="4000" dirty="0">
+              <a:latin typeface="Calibri Light" panose="020F0302020204030204" pitchFamily="34" charset="0"/>
+              <a:cs typeface="Calibri Light" panose="020F0302020204030204" pitchFamily="34" charset="0"/>
+            </a:endParaRPr>
+          </a:p>
+        </p:txBody>
+      </p:sp>
+      <p:sp>
+        <p:nvSpPr>
+          <p:cNvPr id="8" name="אליפסה 7">
+            <a:extLst>
+              <a:ext uri="{FF2B5EF4-FFF2-40B4-BE49-F238E27FC236}">
+                <a16:creationId xmlns:a16="http://schemas.microsoft.com/office/drawing/2014/main" id="{6622B4B9-1ABA-4F0D-BF8E-BAF76FB4FEAC}"/>
+              </a:ext>
+            </a:extLst>
+          </p:cNvPr>
+          <p:cNvSpPr/>
+          <p:nvPr/>
+        </p:nvSpPr>
+        <p:spPr>
+          <a:xfrm>
+            <a:off x="6539830" y="14243522"/>
+            <a:ext cx="515816" cy="515816"/>
+          </a:xfrm>
+          <a:prstGeom prst="ellipse">
+            <a:avLst/>
+          </a:prstGeom>
+          <a:solidFill>
+            <a:srgbClr val="0000FF"/>
+          </a:solidFill>
+          <a:ln>
+            <a:noFill/>
+          </a:ln>
+        </p:spPr>
+        <p:style>
+          <a:lnRef idx="2">
+            <a:schemeClr val="accent1">
+              <a:shade val="50000"/>
+            </a:schemeClr>
+          </a:lnRef>
+          <a:fillRef idx="1">
+            <a:schemeClr val="accent1"/>
+          </a:fillRef>
+          <a:effectRef idx="0">
+            <a:schemeClr val="accent1"/>
+          </a:effectRef>
+          <a:fontRef idx="minor">
+            <a:schemeClr val="lt1"/>
+          </a:fontRef>
+        </p:style>
+        <p:txBody>
+          <a:bodyPr rtlCol="0" anchor="ctr"/>
+          <a:lstStyle/>
+          <a:p>
+            <a:pPr algn="ctr"/>
+            <a:endParaRPr lang="en-IL"/>
+          </a:p>
+        </p:txBody>
+      </p:sp>
+      <p:sp>
+        <p:nvSpPr>
+          <p:cNvPr id="9" name="אליפסה 8">
+            <a:extLst>
+              <a:ext uri="{FF2B5EF4-FFF2-40B4-BE49-F238E27FC236}">
+                <a16:creationId xmlns:a16="http://schemas.microsoft.com/office/drawing/2014/main" id="{F777F088-8198-477F-998E-D508C42321C5}"/>
+              </a:ext>
+            </a:extLst>
+          </p:cNvPr>
+          <p:cNvSpPr/>
+          <p:nvPr/>
+        </p:nvSpPr>
+        <p:spPr>
+          <a:xfrm>
+            <a:off x="13893802" y="14243522"/>
+            <a:ext cx="515816" cy="515816"/>
+          </a:xfrm>
+          <a:prstGeom prst="ellipse">
+            <a:avLst/>
+          </a:prstGeom>
+          <a:solidFill>
+            <a:srgbClr val="FF0000"/>
+          </a:solidFill>
+          <a:ln>
+            <a:noFill/>
+          </a:ln>
+        </p:spPr>
+        <p:style>
+          <a:lnRef idx="2">
+            <a:schemeClr val="accent1">
+              <a:shade val="50000"/>
+            </a:schemeClr>
+          </a:lnRef>
+          <a:fillRef idx="1">
+            <a:schemeClr val="accent1"/>
+          </a:fillRef>
+          <a:effectRef idx="0">
+            <a:schemeClr val="accent1"/>
+          </a:effectRef>
+          <a:fontRef idx="minor">
+            <a:schemeClr val="lt1"/>
+          </a:fontRef>
+        </p:style>
+        <p:txBody>
+          <a:bodyPr rtlCol="0" anchor="ctr"/>
+          <a:lstStyle/>
+          <a:p>
+            <a:pPr algn="ctr"/>
+            <a:endParaRPr lang="en-IL"/>
+          </a:p>
+        </p:txBody>
+      </p:sp>
+    </p:spTree>
+    <p:extLst>
+      <p:ext uri="{BB962C8B-B14F-4D97-AF65-F5344CB8AC3E}">
+        <p14:creationId xmlns:p14="http://schemas.microsoft.com/office/powerpoint/2010/main" val="2714051055"/>
+      </p:ext>
+    </p:extLst>
+  </p:cSld>
+  <p:clrMapOvr>
+    <a:masterClrMapping/>
+  </p:clrMapOvr>
+</p:sld>
+</file>
+
 <file path=ppt/theme/theme1.xml><?xml version="1.0" encoding="utf-8"?>
 <a:theme xmlns:a="http://schemas.openxmlformats.org/drawingml/2006/main" name="ערכת נושא Office">
   <a:themeElements>

</xml_diff>

<commit_message>
added new instructions png
</commit_message>
<xml_diff>
--- a/instructions.pptx
+++ b/instructions.pptx
@@ -244,7 +244,7 @@
           <a:p>
             <a:fld id="{45FE9400-3064-4603-AB37-72E582AC0DEA}" type="datetimeFigureOut">
               <a:rPr lang="en-IL" smtClean="0"/>
-              <a:t>13/01/2021</a:t>
+              <a:t>1/14/21</a:t>
             </a:fld>
             <a:endParaRPr lang="en-IL" dirty="0"/>
           </a:p>
@@ -414,7 +414,7 @@
           <a:p>
             <a:fld id="{45FE9400-3064-4603-AB37-72E582AC0DEA}" type="datetimeFigureOut">
               <a:rPr lang="en-IL" smtClean="0"/>
-              <a:t>13/01/2021</a:t>
+              <a:t>1/14/21</a:t>
             </a:fld>
             <a:endParaRPr lang="en-IL" dirty="0"/>
           </a:p>
@@ -594,7 +594,7 @@
           <a:p>
             <a:fld id="{45FE9400-3064-4603-AB37-72E582AC0DEA}" type="datetimeFigureOut">
               <a:rPr lang="en-IL" smtClean="0"/>
-              <a:t>13/01/2021</a:t>
+              <a:t>1/14/21</a:t>
             </a:fld>
             <a:endParaRPr lang="en-IL" dirty="0"/>
           </a:p>
@@ -764,7 +764,7 @@
           <a:p>
             <a:fld id="{45FE9400-3064-4603-AB37-72E582AC0DEA}" type="datetimeFigureOut">
               <a:rPr lang="en-IL" smtClean="0"/>
-              <a:t>13/01/2021</a:t>
+              <a:t>1/14/21</a:t>
             </a:fld>
             <a:endParaRPr lang="en-IL" dirty="0"/>
           </a:p>
@@ -1008,7 +1008,7 @@
           <a:p>
             <a:fld id="{45FE9400-3064-4603-AB37-72E582AC0DEA}" type="datetimeFigureOut">
               <a:rPr lang="en-IL" smtClean="0"/>
-              <a:t>13/01/2021</a:t>
+              <a:t>1/14/21</a:t>
             </a:fld>
             <a:endParaRPr lang="en-IL" dirty="0"/>
           </a:p>
@@ -1240,7 +1240,7 @@
           <a:p>
             <a:fld id="{45FE9400-3064-4603-AB37-72E582AC0DEA}" type="datetimeFigureOut">
               <a:rPr lang="en-IL" smtClean="0"/>
-              <a:t>13/01/2021</a:t>
+              <a:t>1/14/21</a:t>
             </a:fld>
             <a:endParaRPr lang="en-IL" dirty="0"/>
           </a:p>
@@ -1607,7 +1607,7 @@
           <a:p>
             <a:fld id="{45FE9400-3064-4603-AB37-72E582AC0DEA}" type="datetimeFigureOut">
               <a:rPr lang="en-IL" smtClean="0"/>
-              <a:t>13/01/2021</a:t>
+              <a:t>1/14/21</a:t>
             </a:fld>
             <a:endParaRPr lang="en-IL" dirty="0"/>
           </a:p>
@@ -1725,7 +1725,7 @@
           <a:p>
             <a:fld id="{45FE9400-3064-4603-AB37-72E582AC0DEA}" type="datetimeFigureOut">
               <a:rPr lang="en-IL" smtClean="0"/>
-              <a:t>13/01/2021</a:t>
+              <a:t>1/14/21</a:t>
             </a:fld>
             <a:endParaRPr lang="en-IL" dirty="0"/>
           </a:p>
@@ -1820,7 +1820,7 @@
           <a:p>
             <a:fld id="{45FE9400-3064-4603-AB37-72E582AC0DEA}" type="datetimeFigureOut">
               <a:rPr lang="en-IL" smtClean="0"/>
-              <a:t>13/01/2021</a:t>
+              <a:t>1/14/21</a:t>
             </a:fld>
             <a:endParaRPr lang="en-IL" dirty="0"/>
           </a:p>
@@ -2097,7 +2097,7 @@
           <a:p>
             <a:fld id="{45FE9400-3064-4603-AB37-72E582AC0DEA}" type="datetimeFigureOut">
               <a:rPr lang="en-IL" smtClean="0"/>
-              <a:t>13/01/2021</a:t>
+              <a:t>1/14/21</a:t>
             </a:fld>
             <a:endParaRPr lang="en-IL" dirty="0"/>
           </a:p>
@@ -2354,7 +2354,7 @@
           <a:p>
             <a:fld id="{45FE9400-3064-4603-AB37-72E582AC0DEA}" type="datetimeFigureOut">
               <a:rPr lang="en-IL" smtClean="0"/>
-              <a:t>13/01/2021</a:t>
+              <a:t>1/14/21</a:t>
             </a:fld>
             <a:endParaRPr lang="en-IL" dirty="0"/>
           </a:p>
@@ -2567,7 +2567,7 @@
           <a:p>
             <a:fld id="{45FE9400-3064-4603-AB37-72E582AC0DEA}" type="datetimeFigureOut">
               <a:rPr lang="en-IL" smtClean="0"/>
-              <a:t>13/01/2021</a:t>
+              <a:t>1/14/21</a:t>
             </a:fld>
             <a:endParaRPr lang="en-IL" dirty="0"/>
           </a:p>
@@ -2986,7 +2986,7 @@
         </p:nvGrpSpPr>
         <p:grpSpPr>
           <a:xfrm>
-            <a:off x="346810" y="367503"/>
+            <a:off x="288192" y="543348"/>
             <a:ext cx="26423815" cy="16913966"/>
             <a:chOff x="7775141" y="5745710"/>
             <a:chExt cx="11500945" cy="7066756"/>
@@ -3048,7 +3048,7 @@
                 <a:t>Y</a:t>
               </a:r>
               <a:r>
-                <a:rPr lang="en-IL" sz="3600" dirty="0">
+                <a:rPr lang="en-IL" sz="3600">
                   <a:latin typeface="Avenir Next LT Pro" panose="020B0504020202020204" pitchFamily="34" charset="0"/>
                 </a:rPr>
                 <a:t>our goal, </a:t>
@@ -3060,10 +3060,28 @@
                 <a:t>should</a:t>
               </a:r>
               <a:r>
+                <a:rPr lang="en-IL" sz="3600">
+                  <a:latin typeface="Avenir Next LT Pro" panose="020B0504020202020204" pitchFamily="34" charset="0"/>
+                </a:rPr>
+                <a:t> you choose to accept it, </a:t>
+              </a:r>
+              <a:r>
                 <a:rPr lang="en-IL" sz="3600" dirty="0">
                   <a:latin typeface="Avenir Next LT Pro" panose="020B0504020202020204" pitchFamily="34" charset="0"/>
                 </a:rPr>
-                <a:t> you choose to accept it, is to gain as many points as possible.  To gain points, you must create words from the randomly assorted letters in the cube grid. The longer the word, the higher the point value of the word.</a:t>
+                <a:t>is to gain as many points </a:t>
+              </a:r>
+              <a:r>
+                <a:rPr lang="en-IL" sz="3600">
+                  <a:latin typeface="Avenir Next LT Pro" panose="020B0504020202020204" pitchFamily="34" charset="0"/>
+                </a:rPr>
+                <a:t>as possible.  </a:t>
+              </a:r>
+              <a:r>
+                <a:rPr lang="en-IL" sz="3600" dirty="0">
+                  <a:latin typeface="Avenir Next LT Pro" panose="020B0504020202020204" pitchFamily="34" charset="0"/>
+                </a:rPr>
+                <a:t>To gain points, you must create words from the randomly assorted letters in the cube grid. The longer the word, the higher the point value of the word.</a:t>
               </a:r>
               <a:endParaRPr lang="en-US" sz="3600" dirty="0">
                 <a:latin typeface="Avenir Next LT Pro" panose="020B0504020202020204" pitchFamily="34" charset="0"/>
@@ -3174,7 +3192,31 @@
                 <a:rPr lang="en-IL" sz="3600" dirty="0">
                   <a:latin typeface="Avenir Next LT Pro" panose="020B0504020202020204" pitchFamily="34" charset="0"/>
                 </a:rPr>
-                <a:t>Words should be created by using adjoining letters – the letters must touch each other – and must be able to connect in the proper sequence to spell the word correctly. The letters may join in any direction – horizontally, vertically, or diagonally. Words can be spelled in any direction, including backwards. You may not use a letter cube multiple times in a single word.  </a:t>
+                <a:t>Words should be created by using adjoining letters – the letters must touch each other – and must be able to connect in the proper sequence to spell the word correctly. The letters may join in any direction – horizontally, vertically, or diagonally. Words can </a:t>
+              </a:r>
+              <a:r>
+                <a:rPr lang="en-IL" sz="3600">
+                  <a:latin typeface="Avenir Next LT Pro" panose="020B0504020202020204" pitchFamily="34" charset="0"/>
+                </a:rPr>
+                <a:t>be spel</a:t>
+              </a:r>
+              <a:r>
+                <a:rPr lang="en-GB" sz="3600" dirty="0">
+                  <a:latin typeface="Avenir Next LT Pro" panose="020B0504020202020204" pitchFamily="34" charset="0"/>
+                </a:rPr>
+                <a:t>t</a:t>
+              </a:r>
+              <a:r>
+                <a:rPr lang="en-IL" sz="3600">
+                  <a:latin typeface="Avenir Next LT Pro" panose="020B0504020202020204" pitchFamily="34" charset="0"/>
+                </a:rPr>
+                <a:t> </a:t>
+              </a:r>
+              <a:r>
+                <a:rPr lang="en-IL" sz="3600" dirty="0">
+                  <a:latin typeface="Avenir Next LT Pro" panose="020B0504020202020204" pitchFamily="34" charset="0"/>
+                </a:rPr>
+                <a:t>in any direction, including backwards. You may not use a letter cube multiple times in a single word.  </a:t>
               </a:r>
               <a:endParaRPr lang="en-US" sz="3600" dirty="0">
                 <a:latin typeface="Avenir Next LT Pro" panose="020B0504020202020204" pitchFamily="34" charset="0"/>
@@ -3203,21 +3245,24 @@
                 </a:lnSpc>
               </a:pPr>
               <a:r>
-                <a:rPr lang="en-IL" sz="3600" dirty="0">
+                <a:rPr lang="en-GB" sz="3600" dirty="0">
                   <a:latin typeface="Avenir Next LT Pro" panose="020B0504020202020204" pitchFamily="34" charset="0"/>
                 </a:rPr>
-                <a:t>When the timer runs out, the game will show an end game screen with your score and the words you found (and some might have missed if there are any).</a:t>
+                <a:t>You may use the hint option when needed, it will reveal for a split second a randomly existing word. Remember to use it carefully as it charges you with points. </a:t>
               </a:r>
+              <a:endParaRPr lang="en-IL" sz="3600" dirty="0">
+                <a:latin typeface="Avenir Next LT Pro" panose="020B0504020202020204" pitchFamily="34" charset="0"/>
+              </a:endParaRPr>
             </a:p>
           </p:txBody>
         </p:sp>
       </p:grpSp>
       <p:pic>
         <p:nvPicPr>
-          <p:cNvPr id="6" name="תמונה 5">
+          <p:cNvPr id="9" name="Picture 8" descr="Graphical user interface, application&#10;&#10;Description automatically generated">
             <a:extLst>
               <a:ext uri="{FF2B5EF4-FFF2-40B4-BE49-F238E27FC236}">
-                <a16:creationId xmlns:a16="http://schemas.microsoft.com/office/drawing/2014/main" id="{B9CD11D1-D809-433E-8E49-01B726FF625C}"/>
+                <a16:creationId xmlns:a16="http://schemas.microsoft.com/office/drawing/2014/main" id="{364296B1-A4F3-A44A-98A7-E9BEF4BD4960}"/>
               </a:ext>
             </a:extLst>
           </p:cNvPr>
@@ -3239,9 +3284,334 @@
           </a:stretch>
         </p:blipFill>
         <p:spPr>
+          <a:xfrm rot="158458">
+            <a:off x="14102634" y="4760138"/>
+            <a:ext cx="11839334" cy="8356258"/>
+          </a:xfrm>
+          <a:prstGeom prst="rect">
+            <a:avLst/>
+          </a:prstGeom>
+          <a:ln>
+            <a:noFill/>
+          </a:ln>
+          <a:effectLst>
+            <a:outerShdw blurRad="292100" dist="139700" dir="2700000" algn="tl" rotWithShape="0">
+              <a:srgbClr val="333333">
+                <a:alpha val="65000"/>
+              </a:srgbClr>
+            </a:outerShdw>
+          </a:effectLst>
+        </p:spPr>
+      </p:pic>
+      <p:pic>
+        <p:nvPicPr>
+          <p:cNvPr id="13" name="Picture 12" descr="Icon&#10;&#10;Description automatically generated">
+            <a:extLst>
+              <a:ext uri="{FF2B5EF4-FFF2-40B4-BE49-F238E27FC236}">
+                <a16:creationId xmlns:a16="http://schemas.microsoft.com/office/drawing/2014/main" id="{D8733752-3B02-1E48-8D4E-D5F55708100B}"/>
+              </a:ext>
+            </a:extLst>
+          </p:cNvPr>
+          <p:cNvPicPr>
+            <a:picLocks noChangeAspect="1"/>
+          </p:cNvPicPr>
+          <p:nvPr/>
+        </p:nvPicPr>
+        <p:blipFill rotWithShape="1">
+          <a:blip r:embed="rId3">
+            <a:extLst>
+              <a:ext uri="{28A0092B-C50C-407E-A947-70E740481C1C}">
+                <a14:useLocalDpi xmlns:a14="http://schemas.microsoft.com/office/drawing/2010/main" val="0"/>
+              </a:ext>
+            </a:extLst>
+          </a:blip>
+          <a:srcRect l="35431" t="-5646" b="73142"/>
+          <a:stretch/>
+        </p:blipFill>
+        <p:spPr>
           <a:xfrm>
-            <a:off x="14054094" y="5611488"/>
-            <a:ext cx="12162535" cy="9121901"/>
+            <a:off x="20139880" y="16007914"/>
+            <a:ext cx="4523980" cy="1708031"/>
+          </a:xfrm>
+          <a:prstGeom prst="rect">
+            <a:avLst/>
+          </a:prstGeom>
+        </p:spPr>
+      </p:pic>
+      <p:pic>
+        <p:nvPicPr>
+          <p:cNvPr id="14" name="Picture 13" descr="Icon&#10;&#10;Description automatically generated">
+            <a:extLst>
+              <a:ext uri="{FF2B5EF4-FFF2-40B4-BE49-F238E27FC236}">
+                <a16:creationId xmlns:a16="http://schemas.microsoft.com/office/drawing/2014/main" id="{3EE4BEA2-92B6-C24B-9559-DDB9D404AA13}"/>
+              </a:ext>
+            </a:extLst>
+          </p:cNvPr>
+          <p:cNvPicPr>
+            <a:picLocks noChangeAspect="1"/>
+          </p:cNvPicPr>
+          <p:nvPr/>
+        </p:nvPicPr>
+        <p:blipFill rotWithShape="1">
+          <a:blip r:embed="rId3">
+            <a:extLst>
+              <a:ext uri="{28A0092B-C50C-407E-A947-70E740481C1C}">
+                <a14:useLocalDpi xmlns:a14="http://schemas.microsoft.com/office/drawing/2010/main" val="0"/>
+              </a:ext>
+            </a:extLst>
+          </a:blip>
+          <a:srcRect l="35431" t="67248"/>
+          <a:stretch/>
+        </p:blipFill>
+        <p:spPr>
+          <a:xfrm>
+            <a:off x="15552764" y="16084523"/>
+            <a:ext cx="4523980" cy="1720998"/>
+          </a:xfrm>
+          <a:prstGeom prst="rect">
+            <a:avLst/>
+          </a:prstGeom>
+        </p:spPr>
+      </p:pic>
+      <p:pic>
+        <p:nvPicPr>
+          <p:cNvPr id="17" name="Picture 16" descr="Icon&#10;&#10;Description automatically generated">
+            <a:extLst>
+              <a:ext uri="{FF2B5EF4-FFF2-40B4-BE49-F238E27FC236}">
+                <a16:creationId xmlns:a16="http://schemas.microsoft.com/office/drawing/2014/main" id="{67EFFF09-64B1-4641-A33D-A3F7E5AFE3BD}"/>
+              </a:ext>
+            </a:extLst>
+          </p:cNvPr>
+          <p:cNvPicPr>
+            <a:picLocks noChangeAspect="1"/>
+          </p:cNvPicPr>
+          <p:nvPr/>
+        </p:nvPicPr>
+        <p:blipFill rotWithShape="1">
+          <a:blip r:embed="rId3">
+            <a:extLst>
+              <a:ext uri="{28A0092B-C50C-407E-A947-70E740481C1C}">
+                <a14:useLocalDpi xmlns:a14="http://schemas.microsoft.com/office/drawing/2010/main" val="0"/>
+              </a:ext>
+            </a:extLst>
+          </a:blip>
+          <a:srcRect t="31822" r="66427" b="33958"/>
+          <a:stretch/>
+        </p:blipFill>
+        <p:spPr>
+          <a:xfrm>
+            <a:off x="17132787" y="13650978"/>
+            <a:ext cx="2352219" cy="1798213"/>
+          </a:xfrm>
+          <a:prstGeom prst="rect">
+            <a:avLst/>
+          </a:prstGeom>
+        </p:spPr>
+      </p:pic>
+      <p:pic>
+        <p:nvPicPr>
+          <p:cNvPr id="18" name="Picture 17" descr="Icon&#10;&#10;Description automatically generated">
+            <a:extLst>
+              <a:ext uri="{FF2B5EF4-FFF2-40B4-BE49-F238E27FC236}">
+                <a16:creationId xmlns:a16="http://schemas.microsoft.com/office/drawing/2014/main" id="{B5085776-F926-EB40-80B6-EB08FC440E71}"/>
+              </a:ext>
+            </a:extLst>
+          </p:cNvPr>
+          <p:cNvPicPr>
+            <a:picLocks noChangeAspect="1"/>
+          </p:cNvPicPr>
+          <p:nvPr/>
+        </p:nvPicPr>
+        <p:blipFill rotWithShape="1">
+          <a:blip r:embed="rId3">
+            <a:extLst>
+              <a:ext uri="{28A0092B-C50C-407E-A947-70E740481C1C}">
+                <a14:useLocalDpi xmlns:a14="http://schemas.microsoft.com/office/drawing/2010/main" val="0"/>
+              </a:ext>
+            </a:extLst>
+          </a:blip>
+          <a:srcRect l="64441" t="32965" b="32816"/>
+          <a:stretch/>
+        </p:blipFill>
+        <p:spPr>
+          <a:xfrm>
+            <a:off x="20731011" y="13803781"/>
+            <a:ext cx="2491433" cy="1798213"/>
+          </a:xfrm>
+          <a:prstGeom prst="rect">
+            <a:avLst/>
+          </a:prstGeom>
+        </p:spPr>
+      </p:pic>
+      <p:pic>
+        <p:nvPicPr>
+          <p:cNvPr id="19" name="Picture 18" descr="Icon&#10;&#10;Description automatically generated">
+            <a:extLst>
+              <a:ext uri="{FF2B5EF4-FFF2-40B4-BE49-F238E27FC236}">
+                <a16:creationId xmlns:a16="http://schemas.microsoft.com/office/drawing/2014/main" id="{0A939B07-F693-E143-9EBF-E9E73EF3B41E}"/>
+              </a:ext>
+            </a:extLst>
+          </p:cNvPr>
+          <p:cNvPicPr>
+            <a:picLocks noChangeAspect="1"/>
+          </p:cNvPicPr>
+          <p:nvPr/>
+        </p:nvPicPr>
+        <p:blipFill rotWithShape="1">
+          <a:blip r:embed="rId3">
+            <a:extLst>
+              <a:ext uri="{28A0092B-C50C-407E-A947-70E740481C1C}">
+                <a14:useLocalDpi xmlns:a14="http://schemas.microsoft.com/office/drawing/2010/main" val="0"/>
+              </a:ext>
+            </a:extLst>
+          </a:blip>
+          <a:srcRect l="34009" t="31822" r="34066" b="32816"/>
+          <a:stretch/>
+        </p:blipFill>
+        <p:spPr>
+          <a:xfrm>
+            <a:off x="24230967" y="15661251"/>
+            <a:ext cx="2236837" cy="1858238"/>
+          </a:xfrm>
+          <a:prstGeom prst="rect">
+            <a:avLst/>
+          </a:prstGeom>
+        </p:spPr>
+      </p:pic>
+      <p:pic>
+        <p:nvPicPr>
+          <p:cNvPr id="20" name="Picture 19" descr="Icon&#10;&#10;Description automatically generated">
+            <a:extLst>
+              <a:ext uri="{FF2B5EF4-FFF2-40B4-BE49-F238E27FC236}">
+                <a16:creationId xmlns:a16="http://schemas.microsoft.com/office/drawing/2014/main" id="{D7019683-7B4A-CA4C-BE72-F578DA511C3C}"/>
+              </a:ext>
+            </a:extLst>
+          </p:cNvPr>
+          <p:cNvPicPr>
+            <a:picLocks noChangeAspect="1"/>
+          </p:cNvPicPr>
+          <p:nvPr/>
+        </p:nvPicPr>
+        <p:blipFill rotWithShape="1">
+          <a:blip r:embed="rId3">
+            <a:extLst>
+              <a:ext uri="{28A0092B-C50C-407E-A947-70E740481C1C}">
+                <a14:useLocalDpi xmlns:a14="http://schemas.microsoft.com/office/drawing/2010/main" val="0"/>
+              </a:ext>
+            </a:extLst>
+          </a:blip>
+          <a:srcRect t="-8574" r="66270" b="73143"/>
+          <a:stretch/>
+        </p:blipFill>
+        <p:spPr>
+          <a:xfrm rot="21267503">
+            <a:off x="13463470" y="15541529"/>
+            <a:ext cx="2363263" cy="1861814"/>
+          </a:xfrm>
+          <a:prstGeom prst="rect">
+            <a:avLst/>
+          </a:prstGeom>
+        </p:spPr>
+      </p:pic>
+      <p:pic>
+        <p:nvPicPr>
+          <p:cNvPr id="21" name="Picture 20" descr="Icon&#10;&#10;Description automatically generated">
+            <a:extLst>
+              <a:ext uri="{FF2B5EF4-FFF2-40B4-BE49-F238E27FC236}">
+                <a16:creationId xmlns:a16="http://schemas.microsoft.com/office/drawing/2014/main" id="{F296E356-1772-2946-9C7D-6ECFDF925CA1}"/>
+              </a:ext>
+            </a:extLst>
+          </p:cNvPr>
+          <p:cNvPicPr>
+            <a:picLocks noChangeAspect="1"/>
+          </p:cNvPicPr>
+          <p:nvPr/>
+        </p:nvPicPr>
+        <p:blipFill rotWithShape="1">
+          <a:blip r:embed="rId3">
+            <a:extLst>
+              <a:ext uri="{28A0092B-C50C-407E-A947-70E740481C1C}">
+                <a14:useLocalDpi xmlns:a14="http://schemas.microsoft.com/office/drawing/2010/main" val="0"/>
+              </a:ext>
+            </a:extLst>
+          </a:blip>
+          <a:srcRect t="65779" r="64963"/>
+          <a:stretch/>
+        </p:blipFill>
+        <p:spPr>
+          <a:xfrm>
+            <a:off x="15481661" y="14550084"/>
+            <a:ext cx="2454830" cy="1798214"/>
+          </a:xfrm>
+          <a:prstGeom prst="rect">
+            <a:avLst/>
+          </a:prstGeom>
+        </p:spPr>
+      </p:pic>
+      <p:pic>
+        <p:nvPicPr>
+          <p:cNvPr id="22" name="Picture 21" descr="Icon&#10;&#10;Description automatically generated">
+            <a:extLst>
+              <a:ext uri="{FF2B5EF4-FFF2-40B4-BE49-F238E27FC236}">
+                <a16:creationId xmlns:a16="http://schemas.microsoft.com/office/drawing/2014/main" id="{BA5265C5-52EE-0D4F-891A-2EA13FB6FC12}"/>
+              </a:ext>
+            </a:extLst>
+          </p:cNvPr>
+          <p:cNvPicPr>
+            <a:picLocks noChangeAspect="1"/>
+          </p:cNvPicPr>
+          <p:nvPr/>
+        </p:nvPicPr>
+        <p:blipFill rotWithShape="1">
+          <a:blip r:embed="rId3">
+            <a:extLst>
+              <a:ext uri="{28A0092B-C50C-407E-A947-70E740481C1C}">
+                <a14:useLocalDpi xmlns:a14="http://schemas.microsoft.com/office/drawing/2010/main" val="0"/>
+              </a:ext>
+            </a:extLst>
+          </a:blip>
+          <a:srcRect l="34009" t="31822" r="34066" b="32816"/>
+          <a:stretch/>
+        </p:blipFill>
+        <p:spPr>
+          <a:xfrm>
+            <a:off x="18895024" y="14644657"/>
+            <a:ext cx="2236837" cy="1858238"/>
+          </a:xfrm>
+          <a:prstGeom prst="rect">
+            <a:avLst/>
+          </a:prstGeom>
+        </p:spPr>
+      </p:pic>
+      <p:pic>
+        <p:nvPicPr>
+          <p:cNvPr id="23" name="Picture 22" descr="Icon&#10;&#10;Description automatically generated">
+            <a:extLst>
+              <a:ext uri="{FF2B5EF4-FFF2-40B4-BE49-F238E27FC236}">
+                <a16:creationId xmlns:a16="http://schemas.microsoft.com/office/drawing/2014/main" id="{7494BE9B-C904-6F44-9962-6CF191C7CEF8}"/>
+              </a:ext>
+            </a:extLst>
+          </p:cNvPr>
+          <p:cNvPicPr>
+            <a:picLocks noChangeAspect="1"/>
+          </p:cNvPicPr>
+          <p:nvPr/>
+        </p:nvPicPr>
+        <p:blipFill rotWithShape="1">
+          <a:blip r:embed="rId3">
+            <a:extLst>
+              <a:ext uri="{28A0092B-C50C-407E-A947-70E740481C1C}">
+                <a14:useLocalDpi xmlns:a14="http://schemas.microsoft.com/office/drawing/2010/main" val="0"/>
+              </a:ext>
+            </a:extLst>
+          </a:blip>
+          <a:srcRect t="65779" r="64963"/>
+          <a:stretch/>
+        </p:blipFill>
+        <p:spPr>
+          <a:xfrm>
+            <a:off x="22090394" y="14055064"/>
+            <a:ext cx="2454830" cy="1798214"/>
           </a:xfrm>
           <a:prstGeom prst="rect">
             <a:avLst/>

</xml_diff>